<commit_message>
[HY] Final version of PPT.
</commit_message>
<xml_diff>
--- a/CS410 - Text Information Systems - Final presentation.pptx
+++ b/CS410 - Text Information Systems - Final presentation.pptx
@@ -4,10 +4,13 @@
   <p:sldMasterIdLst>
     <p:sldMasterId id="2147483648" r:id="rId1"/>
   </p:sldMasterIdLst>
+  <p:notesMasterIdLst>
+    <p:notesMasterId r:id="rId13"/>
+  </p:notesMasterIdLst>
   <p:sldIdLst>
     <p:sldId id="256" r:id="rId2"/>
-    <p:sldId id="257" r:id="rId3"/>
-    <p:sldId id="259" r:id="rId4"/>
+    <p:sldId id="270" r:id="rId3"/>
+    <p:sldId id="271" r:id="rId4"/>
     <p:sldId id="260" r:id="rId5"/>
     <p:sldId id="262" r:id="rId6"/>
     <p:sldId id="265" r:id="rId7"/>
@@ -122,6 +125,1180 @@
 </p:presentation>
 </file>
 
+<file path=ppt/notesMasters/notesMaster1.xml><?xml version="1.0" encoding="utf-8"?>
+<p:notesMaster xmlns:a="http://schemas.openxmlformats.org/drawingml/2006/main" xmlns:r="http://schemas.openxmlformats.org/officeDocument/2006/relationships" xmlns:p="http://schemas.openxmlformats.org/presentationml/2006/main">
+  <p:cSld>
+    <p:bg>
+      <p:bgRef idx="1001">
+        <a:schemeClr val="bg1"/>
+      </p:bgRef>
+    </p:bg>
+    <p:spTree>
+      <p:nvGrpSpPr>
+        <p:cNvPr id="1" name=""/>
+        <p:cNvGrpSpPr/>
+        <p:nvPr/>
+      </p:nvGrpSpPr>
+      <p:grpSpPr>
+        <a:xfrm>
+          <a:off x="0" y="0"/>
+          <a:ext cx="0" cy="0"/>
+          <a:chOff x="0" y="0"/>
+          <a:chExt cx="0" cy="0"/>
+        </a:xfrm>
+      </p:grpSpPr>
+      <p:sp>
+        <p:nvSpPr>
+          <p:cNvPr id="2" name="Header Placeholder 1"/>
+          <p:cNvSpPr>
+            <a:spLocks noGrp="1"/>
+          </p:cNvSpPr>
+          <p:nvPr>
+            <p:ph type="hdr" sz="quarter"/>
+          </p:nvPr>
+        </p:nvSpPr>
+        <p:spPr>
+          <a:xfrm>
+            <a:off x="0" y="0"/>
+            <a:ext cx="2971800" cy="458788"/>
+          </a:xfrm>
+          <a:prstGeom prst="rect">
+            <a:avLst/>
+          </a:prstGeom>
+        </p:spPr>
+        <p:txBody>
+          <a:bodyPr vert="horz" lIns="91440" tIns="45720" rIns="91440" bIns="45720" rtlCol="0"/>
+          <a:lstStyle>
+            <a:lvl1pPr algn="l">
+              <a:defRPr sz="1200"/>
+            </a:lvl1pPr>
+          </a:lstStyle>
+          <a:p>
+            <a:endParaRPr lang="en-US"/>
+          </a:p>
+        </p:txBody>
+      </p:sp>
+      <p:sp>
+        <p:nvSpPr>
+          <p:cNvPr id="3" name="Date Placeholder 2"/>
+          <p:cNvSpPr>
+            <a:spLocks noGrp="1"/>
+          </p:cNvSpPr>
+          <p:nvPr>
+            <p:ph type="dt" idx="1"/>
+          </p:nvPr>
+        </p:nvSpPr>
+        <p:spPr>
+          <a:xfrm>
+            <a:off x="3884613" y="0"/>
+            <a:ext cx="2971800" cy="458788"/>
+          </a:xfrm>
+          <a:prstGeom prst="rect">
+            <a:avLst/>
+          </a:prstGeom>
+        </p:spPr>
+        <p:txBody>
+          <a:bodyPr vert="horz" lIns="91440" tIns="45720" rIns="91440" bIns="45720" rtlCol="0"/>
+          <a:lstStyle>
+            <a:lvl1pPr algn="r">
+              <a:defRPr sz="1200"/>
+            </a:lvl1pPr>
+          </a:lstStyle>
+          <a:p>
+            <a:fld id="{90E3D4AD-C05B-4806-B72C-0D763F299C16}" type="datetimeFigureOut">
+              <a:rPr lang="en-US" smtClean="0"/>
+              <a:t>12/7/22</a:t>
+            </a:fld>
+            <a:endParaRPr lang="en-US"/>
+          </a:p>
+        </p:txBody>
+      </p:sp>
+      <p:sp>
+        <p:nvSpPr>
+          <p:cNvPr id="4" name="Slide Image Placeholder 3"/>
+          <p:cNvSpPr>
+            <a:spLocks noGrp="1" noRot="1" noChangeAspect="1"/>
+          </p:cNvSpPr>
+          <p:nvPr>
+            <p:ph type="sldImg" idx="2"/>
+          </p:nvPr>
+        </p:nvSpPr>
+        <p:spPr>
+          <a:xfrm>
+            <a:off x="685800" y="1143000"/>
+            <a:ext cx="5486400" cy="3086100"/>
+          </a:xfrm>
+          <a:prstGeom prst="rect">
+            <a:avLst/>
+          </a:prstGeom>
+          <a:noFill/>
+          <a:ln w="12700">
+            <a:solidFill>
+              <a:prstClr val="black"/>
+            </a:solidFill>
+          </a:ln>
+        </p:spPr>
+        <p:txBody>
+          <a:bodyPr vert="horz" lIns="91440" tIns="45720" rIns="91440" bIns="45720" rtlCol="0" anchor="ctr"/>
+          <a:lstStyle/>
+          <a:p>
+            <a:endParaRPr lang="en-US"/>
+          </a:p>
+        </p:txBody>
+      </p:sp>
+      <p:sp>
+        <p:nvSpPr>
+          <p:cNvPr id="5" name="Notes Placeholder 4"/>
+          <p:cNvSpPr>
+            <a:spLocks noGrp="1"/>
+          </p:cNvSpPr>
+          <p:nvPr>
+            <p:ph type="body" sz="quarter" idx="3"/>
+          </p:nvPr>
+        </p:nvSpPr>
+        <p:spPr>
+          <a:xfrm>
+            <a:off x="685800" y="4400550"/>
+            <a:ext cx="5486400" cy="3600450"/>
+          </a:xfrm>
+          <a:prstGeom prst="rect">
+            <a:avLst/>
+          </a:prstGeom>
+        </p:spPr>
+        <p:txBody>
+          <a:bodyPr vert="horz" lIns="91440" tIns="45720" rIns="91440" bIns="45720" rtlCol="0"/>
+          <a:lstStyle/>
+          <a:p>
+            <a:pPr lvl="0"/>
+            <a:r>
+              <a:rPr lang="en-US"/>
+              <a:t>Click to edit Master text styles</a:t>
+            </a:r>
+          </a:p>
+          <a:p>
+            <a:pPr lvl="1"/>
+            <a:r>
+              <a:rPr lang="en-US"/>
+              <a:t>Second level</a:t>
+            </a:r>
+          </a:p>
+          <a:p>
+            <a:pPr lvl="2"/>
+            <a:r>
+              <a:rPr lang="en-US"/>
+              <a:t>Third level</a:t>
+            </a:r>
+          </a:p>
+          <a:p>
+            <a:pPr lvl="3"/>
+            <a:r>
+              <a:rPr lang="en-US"/>
+              <a:t>Fourth level</a:t>
+            </a:r>
+          </a:p>
+          <a:p>
+            <a:pPr lvl="4"/>
+            <a:r>
+              <a:rPr lang="en-US"/>
+              <a:t>Fifth level</a:t>
+            </a:r>
+          </a:p>
+        </p:txBody>
+      </p:sp>
+      <p:sp>
+        <p:nvSpPr>
+          <p:cNvPr id="6" name="Footer Placeholder 5"/>
+          <p:cNvSpPr>
+            <a:spLocks noGrp="1"/>
+          </p:cNvSpPr>
+          <p:nvPr>
+            <p:ph type="ftr" sz="quarter" idx="4"/>
+          </p:nvPr>
+        </p:nvSpPr>
+        <p:spPr>
+          <a:xfrm>
+            <a:off x="0" y="8685213"/>
+            <a:ext cx="2971800" cy="458787"/>
+          </a:xfrm>
+          <a:prstGeom prst="rect">
+            <a:avLst/>
+          </a:prstGeom>
+        </p:spPr>
+        <p:txBody>
+          <a:bodyPr vert="horz" lIns="91440" tIns="45720" rIns="91440" bIns="45720" rtlCol="0" anchor="b"/>
+          <a:lstStyle>
+            <a:lvl1pPr algn="l">
+              <a:defRPr sz="1200"/>
+            </a:lvl1pPr>
+          </a:lstStyle>
+          <a:p>
+            <a:endParaRPr lang="en-US"/>
+          </a:p>
+        </p:txBody>
+      </p:sp>
+      <p:sp>
+        <p:nvSpPr>
+          <p:cNvPr id="7" name="Slide Number Placeholder 6"/>
+          <p:cNvSpPr>
+            <a:spLocks noGrp="1"/>
+          </p:cNvSpPr>
+          <p:nvPr>
+            <p:ph type="sldNum" sz="quarter" idx="5"/>
+          </p:nvPr>
+        </p:nvSpPr>
+        <p:spPr>
+          <a:xfrm>
+            <a:off x="3884613" y="8685213"/>
+            <a:ext cx="2971800" cy="458787"/>
+          </a:xfrm>
+          <a:prstGeom prst="rect">
+            <a:avLst/>
+          </a:prstGeom>
+        </p:spPr>
+        <p:txBody>
+          <a:bodyPr vert="horz" lIns="91440" tIns="45720" rIns="91440" bIns="45720" rtlCol="0" anchor="b"/>
+          <a:lstStyle>
+            <a:lvl1pPr algn="r">
+              <a:defRPr sz="1200"/>
+            </a:lvl1pPr>
+          </a:lstStyle>
+          <a:p>
+            <a:fld id="{6E02241E-2B30-4617-95D5-9BEA759A42CB}" type="slidenum">
+              <a:rPr lang="en-US" smtClean="0"/>
+              <a:t>‹#›</a:t>
+            </a:fld>
+            <a:endParaRPr lang="en-US"/>
+          </a:p>
+        </p:txBody>
+      </p:sp>
+    </p:spTree>
+    <p:extLst>
+      <p:ext uri="{BB962C8B-B14F-4D97-AF65-F5344CB8AC3E}">
+        <p14:creationId xmlns:p14="http://schemas.microsoft.com/office/powerpoint/2010/main" val="1067930344"/>
+      </p:ext>
+    </p:extLst>
+  </p:cSld>
+  <p:clrMap bg1="lt1" tx1="dk1" bg2="lt2" tx2="dk2" accent1="accent1" accent2="accent2" accent3="accent3" accent4="accent4" accent5="accent5" accent6="accent6" hlink="hlink" folHlink="folHlink"/>
+  <p:notesStyle>
+    <a:lvl1pPr marL="0" algn="l" defTabSz="914400" rtl="0" eaLnBrk="1" latinLnBrk="0" hangingPunct="1">
+      <a:defRPr sz="1200" kern="1200">
+        <a:solidFill>
+          <a:schemeClr val="tx1"/>
+        </a:solidFill>
+        <a:latin typeface="+mn-lt"/>
+        <a:ea typeface="+mn-ea"/>
+        <a:cs typeface="+mn-cs"/>
+      </a:defRPr>
+    </a:lvl1pPr>
+    <a:lvl2pPr marL="457200" algn="l" defTabSz="914400" rtl="0" eaLnBrk="1" latinLnBrk="0" hangingPunct="1">
+      <a:defRPr sz="1200" kern="1200">
+        <a:solidFill>
+          <a:schemeClr val="tx1"/>
+        </a:solidFill>
+        <a:latin typeface="+mn-lt"/>
+        <a:ea typeface="+mn-ea"/>
+        <a:cs typeface="+mn-cs"/>
+      </a:defRPr>
+    </a:lvl2pPr>
+    <a:lvl3pPr marL="914400" algn="l" defTabSz="914400" rtl="0" eaLnBrk="1" latinLnBrk="0" hangingPunct="1">
+      <a:defRPr sz="1200" kern="1200">
+        <a:solidFill>
+          <a:schemeClr val="tx1"/>
+        </a:solidFill>
+        <a:latin typeface="+mn-lt"/>
+        <a:ea typeface="+mn-ea"/>
+        <a:cs typeface="+mn-cs"/>
+      </a:defRPr>
+    </a:lvl3pPr>
+    <a:lvl4pPr marL="1371600" algn="l" defTabSz="914400" rtl="0" eaLnBrk="1" latinLnBrk="0" hangingPunct="1">
+      <a:defRPr sz="1200" kern="1200">
+        <a:solidFill>
+          <a:schemeClr val="tx1"/>
+        </a:solidFill>
+        <a:latin typeface="+mn-lt"/>
+        <a:ea typeface="+mn-ea"/>
+        <a:cs typeface="+mn-cs"/>
+      </a:defRPr>
+    </a:lvl4pPr>
+    <a:lvl5pPr marL="1828800" algn="l" defTabSz="914400" rtl="0" eaLnBrk="1" latinLnBrk="0" hangingPunct="1">
+      <a:defRPr sz="1200" kern="1200">
+        <a:solidFill>
+          <a:schemeClr val="tx1"/>
+        </a:solidFill>
+        <a:latin typeface="+mn-lt"/>
+        <a:ea typeface="+mn-ea"/>
+        <a:cs typeface="+mn-cs"/>
+      </a:defRPr>
+    </a:lvl5pPr>
+    <a:lvl6pPr marL="2286000" algn="l" defTabSz="914400" rtl="0" eaLnBrk="1" latinLnBrk="0" hangingPunct="1">
+      <a:defRPr sz="1200" kern="1200">
+        <a:solidFill>
+          <a:schemeClr val="tx1"/>
+        </a:solidFill>
+        <a:latin typeface="+mn-lt"/>
+        <a:ea typeface="+mn-ea"/>
+        <a:cs typeface="+mn-cs"/>
+      </a:defRPr>
+    </a:lvl6pPr>
+    <a:lvl7pPr marL="2743200" algn="l" defTabSz="914400" rtl="0" eaLnBrk="1" latinLnBrk="0" hangingPunct="1">
+      <a:defRPr sz="1200" kern="1200">
+        <a:solidFill>
+          <a:schemeClr val="tx1"/>
+        </a:solidFill>
+        <a:latin typeface="+mn-lt"/>
+        <a:ea typeface="+mn-ea"/>
+        <a:cs typeface="+mn-cs"/>
+      </a:defRPr>
+    </a:lvl7pPr>
+    <a:lvl8pPr marL="3200400" algn="l" defTabSz="914400" rtl="0" eaLnBrk="1" latinLnBrk="0" hangingPunct="1">
+      <a:defRPr sz="1200" kern="1200">
+        <a:solidFill>
+          <a:schemeClr val="tx1"/>
+        </a:solidFill>
+        <a:latin typeface="+mn-lt"/>
+        <a:ea typeface="+mn-ea"/>
+        <a:cs typeface="+mn-cs"/>
+      </a:defRPr>
+    </a:lvl8pPr>
+    <a:lvl9pPr marL="3657600" algn="l" defTabSz="914400" rtl="0" eaLnBrk="1" latinLnBrk="0" hangingPunct="1">
+      <a:defRPr sz="1200" kern="1200">
+        <a:solidFill>
+          <a:schemeClr val="tx1"/>
+        </a:solidFill>
+        <a:latin typeface="+mn-lt"/>
+        <a:ea typeface="+mn-ea"/>
+        <a:cs typeface="+mn-cs"/>
+      </a:defRPr>
+    </a:lvl9pPr>
+  </p:notesStyle>
+</p:notesMaster>
+</file>
+
+<file path=ppt/notesSlides/notesSlide1.xml><?xml version="1.0" encoding="utf-8"?>
+<p:notes xmlns:a="http://schemas.openxmlformats.org/drawingml/2006/main" xmlns:r="http://schemas.openxmlformats.org/officeDocument/2006/relationships" xmlns:p="http://schemas.openxmlformats.org/presentationml/2006/main">
+  <p:cSld>
+    <p:spTree>
+      <p:nvGrpSpPr>
+        <p:cNvPr id="1" name=""/>
+        <p:cNvGrpSpPr/>
+        <p:nvPr/>
+      </p:nvGrpSpPr>
+      <p:grpSpPr>
+        <a:xfrm>
+          <a:off x="0" y="0"/>
+          <a:ext cx="0" cy="0"/>
+          <a:chOff x="0" y="0"/>
+          <a:chExt cx="0" cy="0"/>
+        </a:xfrm>
+      </p:grpSpPr>
+      <p:sp>
+        <p:nvSpPr>
+          <p:cNvPr id="2" name="Slide Image Placeholder 1"/>
+          <p:cNvSpPr>
+            <a:spLocks noGrp="1" noRot="1" noChangeAspect="1"/>
+          </p:cNvSpPr>
+          <p:nvPr>
+            <p:ph type="sldImg"/>
+          </p:nvPr>
+        </p:nvSpPr>
+        <p:spPr/>
+      </p:sp>
+      <p:sp>
+        <p:nvSpPr>
+          <p:cNvPr id="3" name="Notes Placeholder 2"/>
+          <p:cNvSpPr>
+            <a:spLocks noGrp="1"/>
+          </p:cNvSpPr>
+          <p:nvPr>
+            <p:ph type="body" idx="1"/>
+          </p:nvPr>
+        </p:nvSpPr>
+        <p:spPr/>
+        <p:txBody>
+          <a:bodyPr/>
+          <a:lstStyle/>
+          <a:p>
+            <a:r>
+              <a:rPr lang="en-US" dirty="0"/>
+              <a:t>Hello everyone,</a:t>
+            </a:r>
+          </a:p>
+          <a:p>
+            <a:endParaRPr lang="en-US" dirty="0"/>
+          </a:p>
+          <a:p>
+            <a:r>
+              <a:rPr lang="en-US" dirty="0"/>
+              <a:t>Greetings of the Day</a:t>
+            </a:r>
+          </a:p>
+          <a:p>
+            <a:endParaRPr lang="en-US" dirty="0"/>
+          </a:p>
+          <a:p>
+            <a:r>
+              <a:rPr lang="en-US" dirty="0"/>
+              <a:t>My name is Chandan. Today I along with my team mates are going to walk you through the final project presentation for class CS410, Text Information Systems. For our final project, have chosen the Sentiment Analysis of Tweets. </a:t>
+            </a:r>
+          </a:p>
+        </p:txBody>
+      </p:sp>
+      <p:sp>
+        <p:nvSpPr>
+          <p:cNvPr id="4" name="Slide Number Placeholder 3"/>
+          <p:cNvSpPr>
+            <a:spLocks noGrp="1"/>
+          </p:cNvSpPr>
+          <p:nvPr>
+            <p:ph type="sldNum" sz="quarter" idx="5"/>
+          </p:nvPr>
+        </p:nvSpPr>
+        <p:spPr/>
+        <p:txBody>
+          <a:bodyPr/>
+          <a:lstStyle/>
+          <a:p>
+            <a:fld id="{6E02241E-2B30-4617-95D5-9BEA759A42CB}" type="slidenum">
+              <a:rPr lang="en-US" smtClean="0"/>
+              <a:t>1</a:t>
+            </a:fld>
+            <a:endParaRPr lang="en-US"/>
+          </a:p>
+        </p:txBody>
+      </p:sp>
+    </p:spTree>
+    <p:extLst>
+      <p:ext uri="{BB962C8B-B14F-4D97-AF65-F5344CB8AC3E}">
+        <p14:creationId xmlns:p14="http://schemas.microsoft.com/office/powerpoint/2010/main" val="1722755293"/>
+      </p:ext>
+    </p:extLst>
+  </p:cSld>
+  <p:clrMapOvr>
+    <a:masterClrMapping/>
+  </p:clrMapOvr>
+</p:notes>
+</file>
+
+<file path=ppt/notesSlides/notesSlide2.xml><?xml version="1.0" encoding="utf-8"?>
+<p:notes xmlns:a="http://schemas.openxmlformats.org/drawingml/2006/main" xmlns:r="http://schemas.openxmlformats.org/officeDocument/2006/relationships" xmlns:p="http://schemas.openxmlformats.org/presentationml/2006/main">
+  <p:cSld>
+    <p:spTree>
+      <p:nvGrpSpPr>
+        <p:cNvPr id="1" name=""/>
+        <p:cNvGrpSpPr/>
+        <p:nvPr/>
+      </p:nvGrpSpPr>
+      <p:grpSpPr>
+        <a:xfrm>
+          <a:off x="0" y="0"/>
+          <a:ext cx="0" cy="0"/>
+          <a:chOff x="0" y="0"/>
+          <a:chExt cx="0" cy="0"/>
+        </a:xfrm>
+      </p:grpSpPr>
+      <p:sp>
+        <p:nvSpPr>
+          <p:cNvPr id="2" name="Slide Image Placeholder 1"/>
+          <p:cNvSpPr>
+            <a:spLocks noGrp="1" noRot="1" noChangeAspect="1"/>
+          </p:cNvSpPr>
+          <p:nvPr>
+            <p:ph type="sldImg"/>
+          </p:nvPr>
+        </p:nvSpPr>
+        <p:spPr/>
+      </p:sp>
+      <p:sp>
+        <p:nvSpPr>
+          <p:cNvPr id="3" name="Notes Placeholder 2"/>
+          <p:cNvSpPr>
+            <a:spLocks noGrp="1"/>
+          </p:cNvSpPr>
+          <p:nvPr>
+            <p:ph type="body" idx="1"/>
+          </p:nvPr>
+        </p:nvSpPr>
+        <p:spPr/>
+        <p:txBody>
+          <a:bodyPr/>
+          <a:lstStyle/>
+          <a:p>
+            <a:r>
+              <a:rPr lang="en-US" dirty="0"/>
+              <a:t>In this presentation, we are going to cover the following. </a:t>
+            </a:r>
+          </a:p>
+          <a:p>
+            <a:endParaRPr lang="en-US" dirty="0"/>
+          </a:p>
+          <a:p>
+            <a:r>
+              <a:rPr lang="en-US" dirty="0"/>
+              <a:t>We will start by giving our audience an overview of the application including the motivation of choosing the topic</a:t>
+            </a:r>
+          </a:p>
+          <a:p>
+            <a:endParaRPr lang="en-US" dirty="0"/>
+          </a:p>
+          <a:p>
+            <a:r>
+              <a:rPr lang="en-US" dirty="0"/>
+              <a:t>We will them discuss the dataset used this application.</a:t>
+            </a:r>
+          </a:p>
+          <a:p>
+            <a:endParaRPr lang="en-US" dirty="0"/>
+          </a:p>
+          <a:p>
+            <a:r>
+              <a:rPr lang="en-US" dirty="0"/>
+              <a:t>Followed by a high-level overview of different models that we used and how they compare against each other.</a:t>
+            </a:r>
+          </a:p>
+          <a:p>
+            <a:endParaRPr lang="en-US" dirty="0"/>
+          </a:p>
+          <a:p>
+            <a:r>
+              <a:rPr lang="en-US" dirty="0"/>
+              <a:t> We will them walk you though the high-level architecture of the application along with an overview of the code used to perform sentiment analysis.</a:t>
+            </a:r>
+          </a:p>
+          <a:p>
+            <a:endParaRPr lang="en-US" dirty="0"/>
+          </a:p>
+          <a:p>
+            <a:r>
+              <a:rPr lang="en-US" dirty="0"/>
+              <a:t>At the end, we will provide the audience with steps on how to run the application along with the demo.</a:t>
+            </a:r>
+          </a:p>
+        </p:txBody>
+      </p:sp>
+      <p:sp>
+        <p:nvSpPr>
+          <p:cNvPr id="4" name="Slide Number Placeholder 3"/>
+          <p:cNvSpPr>
+            <a:spLocks noGrp="1"/>
+          </p:cNvSpPr>
+          <p:nvPr>
+            <p:ph type="sldNum" sz="quarter" idx="5"/>
+          </p:nvPr>
+        </p:nvSpPr>
+        <p:spPr/>
+        <p:txBody>
+          <a:bodyPr/>
+          <a:lstStyle/>
+          <a:p>
+            <a:fld id="{6E02241E-2B30-4617-95D5-9BEA759A42CB}" type="slidenum">
+              <a:rPr lang="en-US" smtClean="0"/>
+              <a:t>2</a:t>
+            </a:fld>
+            <a:endParaRPr lang="en-US"/>
+          </a:p>
+        </p:txBody>
+      </p:sp>
+    </p:spTree>
+    <p:extLst>
+      <p:ext uri="{BB962C8B-B14F-4D97-AF65-F5344CB8AC3E}">
+        <p14:creationId xmlns:p14="http://schemas.microsoft.com/office/powerpoint/2010/main" val="1578328728"/>
+      </p:ext>
+    </p:extLst>
+  </p:cSld>
+  <p:clrMapOvr>
+    <a:masterClrMapping/>
+  </p:clrMapOvr>
+</p:notes>
+</file>
+
+<file path=ppt/notesSlides/notesSlide3.xml><?xml version="1.0" encoding="utf-8"?>
+<p:notes xmlns:a="http://schemas.openxmlformats.org/drawingml/2006/main" xmlns:r="http://schemas.openxmlformats.org/officeDocument/2006/relationships" xmlns:p="http://schemas.openxmlformats.org/presentationml/2006/main">
+  <p:cSld>
+    <p:spTree>
+      <p:nvGrpSpPr>
+        <p:cNvPr id="1" name=""/>
+        <p:cNvGrpSpPr/>
+        <p:nvPr/>
+      </p:nvGrpSpPr>
+      <p:grpSpPr>
+        <a:xfrm>
+          <a:off x="0" y="0"/>
+          <a:ext cx="0" cy="0"/>
+          <a:chOff x="0" y="0"/>
+          <a:chExt cx="0" cy="0"/>
+        </a:xfrm>
+      </p:grpSpPr>
+      <p:sp>
+        <p:nvSpPr>
+          <p:cNvPr id="2" name="Slide Image Placeholder 1"/>
+          <p:cNvSpPr>
+            <a:spLocks noGrp="1" noRot="1" noChangeAspect="1"/>
+          </p:cNvSpPr>
+          <p:nvPr>
+            <p:ph type="sldImg"/>
+          </p:nvPr>
+        </p:nvSpPr>
+        <p:spPr/>
+      </p:sp>
+      <p:sp>
+        <p:nvSpPr>
+          <p:cNvPr id="3" name="Notes Placeholder 2"/>
+          <p:cNvSpPr>
+            <a:spLocks noGrp="1"/>
+          </p:cNvSpPr>
+          <p:nvPr>
+            <p:ph type="body" idx="1"/>
+          </p:nvPr>
+        </p:nvSpPr>
+        <p:spPr/>
+        <p:txBody>
+          <a:bodyPr/>
+          <a:lstStyle/>
+          <a:p>
+            <a:endParaRPr lang="en-US" dirty="0"/>
+          </a:p>
+        </p:txBody>
+      </p:sp>
+      <p:sp>
+        <p:nvSpPr>
+          <p:cNvPr id="4" name="Slide Number Placeholder 3"/>
+          <p:cNvSpPr>
+            <a:spLocks noGrp="1"/>
+          </p:cNvSpPr>
+          <p:nvPr>
+            <p:ph type="sldNum" sz="quarter" idx="5"/>
+          </p:nvPr>
+        </p:nvSpPr>
+        <p:spPr/>
+        <p:txBody>
+          <a:bodyPr/>
+          <a:lstStyle/>
+          <a:p>
+            <a:fld id="{6E02241E-2B30-4617-95D5-9BEA759A42CB}" type="slidenum">
+              <a:rPr lang="en-US" smtClean="0"/>
+              <a:t>3</a:t>
+            </a:fld>
+            <a:endParaRPr lang="en-US"/>
+          </a:p>
+        </p:txBody>
+      </p:sp>
+    </p:spTree>
+    <p:extLst>
+      <p:ext uri="{BB962C8B-B14F-4D97-AF65-F5344CB8AC3E}">
+        <p14:creationId xmlns:p14="http://schemas.microsoft.com/office/powerpoint/2010/main" val="1158597488"/>
+      </p:ext>
+    </p:extLst>
+  </p:cSld>
+  <p:clrMapOvr>
+    <a:masterClrMapping/>
+  </p:clrMapOvr>
+</p:notes>
+</file>
+
+<file path=ppt/notesSlides/notesSlide4.xml><?xml version="1.0" encoding="utf-8"?>
+<p:notes xmlns:a="http://schemas.openxmlformats.org/drawingml/2006/main" xmlns:r="http://schemas.openxmlformats.org/officeDocument/2006/relationships" xmlns:p="http://schemas.openxmlformats.org/presentationml/2006/main">
+  <p:cSld>
+    <p:spTree>
+      <p:nvGrpSpPr>
+        <p:cNvPr id="1" name=""/>
+        <p:cNvGrpSpPr/>
+        <p:nvPr/>
+      </p:nvGrpSpPr>
+      <p:grpSpPr>
+        <a:xfrm>
+          <a:off x="0" y="0"/>
+          <a:ext cx="0" cy="0"/>
+          <a:chOff x="0" y="0"/>
+          <a:chExt cx="0" cy="0"/>
+        </a:xfrm>
+      </p:grpSpPr>
+      <p:sp>
+        <p:nvSpPr>
+          <p:cNvPr id="2" name="Slide Image Placeholder 1"/>
+          <p:cNvSpPr>
+            <a:spLocks noGrp="1" noRot="1" noChangeAspect="1"/>
+          </p:cNvSpPr>
+          <p:nvPr>
+            <p:ph type="sldImg"/>
+          </p:nvPr>
+        </p:nvSpPr>
+        <p:spPr/>
+      </p:sp>
+      <p:sp>
+        <p:nvSpPr>
+          <p:cNvPr id="3" name="Notes Placeholder 2"/>
+          <p:cNvSpPr>
+            <a:spLocks noGrp="1"/>
+          </p:cNvSpPr>
+          <p:nvPr>
+            <p:ph type="body" idx="1"/>
+          </p:nvPr>
+        </p:nvSpPr>
+        <p:spPr/>
+        <p:txBody>
+          <a:bodyPr/>
+          <a:lstStyle/>
+          <a:p>
+            <a:endParaRPr lang="en-US" dirty="0"/>
+          </a:p>
+        </p:txBody>
+      </p:sp>
+      <p:sp>
+        <p:nvSpPr>
+          <p:cNvPr id="4" name="Slide Number Placeholder 3"/>
+          <p:cNvSpPr>
+            <a:spLocks noGrp="1"/>
+          </p:cNvSpPr>
+          <p:nvPr>
+            <p:ph type="sldNum" sz="quarter" idx="5"/>
+          </p:nvPr>
+        </p:nvSpPr>
+        <p:spPr/>
+        <p:txBody>
+          <a:bodyPr/>
+          <a:lstStyle/>
+          <a:p>
+            <a:fld id="{6E02241E-2B30-4617-95D5-9BEA759A42CB}" type="slidenum">
+              <a:rPr lang="en-US" smtClean="0"/>
+              <a:t>4</a:t>
+            </a:fld>
+            <a:endParaRPr lang="en-US"/>
+          </a:p>
+        </p:txBody>
+      </p:sp>
+    </p:spTree>
+    <p:extLst>
+      <p:ext uri="{BB962C8B-B14F-4D97-AF65-F5344CB8AC3E}">
+        <p14:creationId xmlns:p14="http://schemas.microsoft.com/office/powerpoint/2010/main" val="402414933"/>
+      </p:ext>
+    </p:extLst>
+  </p:cSld>
+  <p:clrMapOvr>
+    <a:masterClrMapping/>
+  </p:clrMapOvr>
+</p:notes>
+</file>
+
+<file path=ppt/notesSlides/notesSlide5.xml><?xml version="1.0" encoding="utf-8"?>
+<p:notes xmlns:a="http://schemas.openxmlformats.org/drawingml/2006/main" xmlns:r="http://schemas.openxmlformats.org/officeDocument/2006/relationships" xmlns:p="http://schemas.openxmlformats.org/presentationml/2006/main">
+  <p:cSld>
+    <p:spTree>
+      <p:nvGrpSpPr>
+        <p:cNvPr id="1" name=""/>
+        <p:cNvGrpSpPr/>
+        <p:nvPr/>
+      </p:nvGrpSpPr>
+      <p:grpSpPr>
+        <a:xfrm>
+          <a:off x="0" y="0"/>
+          <a:ext cx="0" cy="0"/>
+          <a:chOff x="0" y="0"/>
+          <a:chExt cx="0" cy="0"/>
+        </a:xfrm>
+      </p:grpSpPr>
+      <p:sp>
+        <p:nvSpPr>
+          <p:cNvPr id="2" name="Slide Image Placeholder 1"/>
+          <p:cNvSpPr>
+            <a:spLocks noGrp="1" noRot="1" noChangeAspect="1"/>
+          </p:cNvSpPr>
+          <p:nvPr>
+            <p:ph type="sldImg"/>
+          </p:nvPr>
+        </p:nvSpPr>
+        <p:spPr/>
+      </p:sp>
+      <p:sp>
+        <p:nvSpPr>
+          <p:cNvPr id="3" name="Notes Placeholder 2"/>
+          <p:cNvSpPr>
+            <a:spLocks noGrp="1"/>
+          </p:cNvSpPr>
+          <p:nvPr>
+            <p:ph type="body" idx="1"/>
+          </p:nvPr>
+        </p:nvSpPr>
+        <p:spPr/>
+        <p:txBody>
+          <a:bodyPr/>
+          <a:lstStyle/>
+          <a:p>
+            <a:endParaRPr lang="en-US" dirty="0"/>
+          </a:p>
+        </p:txBody>
+      </p:sp>
+      <p:sp>
+        <p:nvSpPr>
+          <p:cNvPr id="4" name="Slide Number Placeholder 3"/>
+          <p:cNvSpPr>
+            <a:spLocks noGrp="1"/>
+          </p:cNvSpPr>
+          <p:nvPr>
+            <p:ph type="sldNum" sz="quarter" idx="5"/>
+          </p:nvPr>
+        </p:nvSpPr>
+        <p:spPr/>
+        <p:txBody>
+          <a:bodyPr/>
+          <a:lstStyle/>
+          <a:p>
+            <a:fld id="{6E02241E-2B30-4617-95D5-9BEA759A42CB}" type="slidenum">
+              <a:rPr lang="en-US" smtClean="0"/>
+              <a:t>5</a:t>
+            </a:fld>
+            <a:endParaRPr lang="en-US"/>
+          </a:p>
+        </p:txBody>
+      </p:sp>
+    </p:spTree>
+    <p:extLst>
+      <p:ext uri="{BB962C8B-B14F-4D97-AF65-F5344CB8AC3E}">
+        <p14:creationId xmlns:p14="http://schemas.microsoft.com/office/powerpoint/2010/main" val="1943185314"/>
+      </p:ext>
+    </p:extLst>
+  </p:cSld>
+  <p:clrMapOvr>
+    <a:masterClrMapping/>
+  </p:clrMapOvr>
+</p:notes>
+</file>
+
+<file path=ppt/notesSlides/notesSlide6.xml><?xml version="1.0" encoding="utf-8"?>
+<p:notes xmlns:a="http://schemas.openxmlformats.org/drawingml/2006/main" xmlns:r="http://schemas.openxmlformats.org/officeDocument/2006/relationships" xmlns:p="http://schemas.openxmlformats.org/presentationml/2006/main">
+  <p:cSld>
+    <p:spTree>
+      <p:nvGrpSpPr>
+        <p:cNvPr id="1" name=""/>
+        <p:cNvGrpSpPr/>
+        <p:nvPr/>
+      </p:nvGrpSpPr>
+      <p:grpSpPr>
+        <a:xfrm>
+          <a:off x="0" y="0"/>
+          <a:ext cx="0" cy="0"/>
+          <a:chOff x="0" y="0"/>
+          <a:chExt cx="0" cy="0"/>
+        </a:xfrm>
+      </p:grpSpPr>
+      <p:sp>
+        <p:nvSpPr>
+          <p:cNvPr id="2" name="Slide Image Placeholder 1"/>
+          <p:cNvSpPr>
+            <a:spLocks noGrp="1" noRot="1" noChangeAspect="1"/>
+          </p:cNvSpPr>
+          <p:nvPr>
+            <p:ph type="sldImg"/>
+          </p:nvPr>
+        </p:nvSpPr>
+        <p:spPr/>
+      </p:sp>
+      <p:sp>
+        <p:nvSpPr>
+          <p:cNvPr id="3" name="Notes Placeholder 2"/>
+          <p:cNvSpPr>
+            <a:spLocks noGrp="1"/>
+          </p:cNvSpPr>
+          <p:nvPr>
+            <p:ph type="body" idx="1"/>
+          </p:nvPr>
+        </p:nvSpPr>
+        <p:spPr/>
+        <p:txBody>
+          <a:bodyPr/>
+          <a:lstStyle/>
+          <a:p>
+            <a:endParaRPr lang="en-US" dirty="0"/>
+          </a:p>
+        </p:txBody>
+      </p:sp>
+      <p:sp>
+        <p:nvSpPr>
+          <p:cNvPr id="4" name="Slide Number Placeholder 3"/>
+          <p:cNvSpPr>
+            <a:spLocks noGrp="1"/>
+          </p:cNvSpPr>
+          <p:nvPr>
+            <p:ph type="sldNum" sz="quarter" idx="5"/>
+          </p:nvPr>
+        </p:nvSpPr>
+        <p:spPr/>
+        <p:txBody>
+          <a:bodyPr/>
+          <a:lstStyle/>
+          <a:p>
+            <a:fld id="{6E02241E-2B30-4617-95D5-9BEA759A42CB}" type="slidenum">
+              <a:rPr lang="en-US" smtClean="0"/>
+              <a:t>6</a:t>
+            </a:fld>
+            <a:endParaRPr lang="en-US"/>
+          </a:p>
+        </p:txBody>
+      </p:sp>
+    </p:spTree>
+    <p:extLst>
+      <p:ext uri="{BB962C8B-B14F-4D97-AF65-F5344CB8AC3E}">
+        <p14:creationId xmlns:p14="http://schemas.microsoft.com/office/powerpoint/2010/main" val="2508234741"/>
+      </p:ext>
+    </p:extLst>
+  </p:cSld>
+  <p:clrMapOvr>
+    <a:masterClrMapping/>
+  </p:clrMapOvr>
+</p:notes>
+</file>
+
+<file path=ppt/notesSlides/notesSlide7.xml><?xml version="1.0" encoding="utf-8"?>
+<p:notes xmlns:a="http://schemas.openxmlformats.org/drawingml/2006/main" xmlns:r="http://schemas.openxmlformats.org/officeDocument/2006/relationships" xmlns:p="http://schemas.openxmlformats.org/presentationml/2006/main">
+  <p:cSld>
+    <p:spTree>
+      <p:nvGrpSpPr>
+        <p:cNvPr id="1" name=""/>
+        <p:cNvGrpSpPr/>
+        <p:nvPr/>
+      </p:nvGrpSpPr>
+      <p:grpSpPr>
+        <a:xfrm>
+          <a:off x="0" y="0"/>
+          <a:ext cx="0" cy="0"/>
+          <a:chOff x="0" y="0"/>
+          <a:chExt cx="0" cy="0"/>
+        </a:xfrm>
+      </p:grpSpPr>
+      <p:sp>
+        <p:nvSpPr>
+          <p:cNvPr id="2" name="Slide Image Placeholder 1"/>
+          <p:cNvSpPr>
+            <a:spLocks noGrp="1" noRot="1" noChangeAspect="1"/>
+          </p:cNvSpPr>
+          <p:nvPr>
+            <p:ph type="sldImg"/>
+          </p:nvPr>
+        </p:nvSpPr>
+        <p:spPr/>
+      </p:sp>
+      <p:sp>
+        <p:nvSpPr>
+          <p:cNvPr id="3" name="Notes Placeholder 2"/>
+          <p:cNvSpPr>
+            <a:spLocks noGrp="1"/>
+          </p:cNvSpPr>
+          <p:nvPr>
+            <p:ph type="body" idx="1"/>
+          </p:nvPr>
+        </p:nvSpPr>
+        <p:spPr/>
+        <p:txBody>
+          <a:bodyPr/>
+          <a:lstStyle/>
+          <a:p>
+            <a:endParaRPr lang="en-US" dirty="0"/>
+          </a:p>
+        </p:txBody>
+      </p:sp>
+      <p:sp>
+        <p:nvSpPr>
+          <p:cNvPr id="4" name="Slide Number Placeholder 3"/>
+          <p:cNvSpPr>
+            <a:spLocks noGrp="1"/>
+          </p:cNvSpPr>
+          <p:nvPr>
+            <p:ph type="sldNum" sz="quarter" idx="5"/>
+          </p:nvPr>
+        </p:nvSpPr>
+        <p:spPr/>
+        <p:txBody>
+          <a:bodyPr/>
+          <a:lstStyle/>
+          <a:p>
+            <a:fld id="{6E02241E-2B30-4617-95D5-9BEA759A42CB}" type="slidenum">
+              <a:rPr lang="en-US" smtClean="0"/>
+              <a:t>7</a:t>
+            </a:fld>
+            <a:endParaRPr lang="en-US"/>
+          </a:p>
+        </p:txBody>
+      </p:sp>
+    </p:spTree>
+    <p:extLst>
+      <p:ext uri="{BB962C8B-B14F-4D97-AF65-F5344CB8AC3E}">
+        <p14:creationId xmlns:p14="http://schemas.microsoft.com/office/powerpoint/2010/main" val="2471102297"/>
+      </p:ext>
+    </p:extLst>
+  </p:cSld>
+  <p:clrMapOvr>
+    <a:masterClrMapping/>
+  </p:clrMapOvr>
+</p:notes>
+</file>
+
+<file path=ppt/notesSlides/notesSlide8.xml><?xml version="1.0" encoding="utf-8"?>
+<p:notes xmlns:a="http://schemas.openxmlformats.org/drawingml/2006/main" xmlns:r="http://schemas.openxmlformats.org/officeDocument/2006/relationships" xmlns:p="http://schemas.openxmlformats.org/presentationml/2006/main">
+  <p:cSld>
+    <p:spTree>
+      <p:nvGrpSpPr>
+        <p:cNvPr id="1" name=""/>
+        <p:cNvGrpSpPr/>
+        <p:nvPr/>
+      </p:nvGrpSpPr>
+      <p:grpSpPr>
+        <a:xfrm>
+          <a:off x="0" y="0"/>
+          <a:ext cx="0" cy="0"/>
+          <a:chOff x="0" y="0"/>
+          <a:chExt cx="0" cy="0"/>
+        </a:xfrm>
+      </p:grpSpPr>
+      <p:sp>
+        <p:nvSpPr>
+          <p:cNvPr id="2" name="Slide Image Placeholder 1"/>
+          <p:cNvSpPr>
+            <a:spLocks noGrp="1" noRot="1" noChangeAspect="1"/>
+          </p:cNvSpPr>
+          <p:nvPr>
+            <p:ph type="sldImg"/>
+          </p:nvPr>
+        </p:nvSpPr>
+        <p:spPr/>
+      </p:sp>
+      <p:sp>
+        <p:nvSpPr>
+          <p:cNvPr id="3" name="Notes Placeholder 2"/>
+          <p:cNvSpPr>
+            <a:spLocks noGrp="1"/>
+          </p:cNvSpPr>
+          <p:nvPr>
+            <p:ph type="body" idx="1"/>
+          </p:nvPr>
+        </p:nvSpPr>
+        <p:spPr/>
+        <p:txBody>
+          <a:bodyPr/>
+          <a:lstStyle/>
+          <a:p>
+            <a:endParaRPr lang="en-US" dirty="0"/>
+          </a:p>
+        </p:txBody>
+      </p:sp>
+      <p:sp>
+        <p:nvSpPr>
+          <p:cNvPr id="4" name="Slide Number Placeholder 3"/>
+          <p:cNvSpPr>
+            <a:spLocks noGrp="1"/>
+          </p:cNvSpPr>
+          <p:nvPr>
+            <p:ph type="sldNum" sz="quarter" idx="5"/>
+          </p:nvPr>
+        </p:nvSpPr>
+        <p:spPr/>
+        <p:txBody>
+          <a:bodyPr/>
+          <a:lstStyle/>
+          <a:p>
+            <a:fld id="{6E02241E-2B30-4617-95D5-9BEA759A42CB}" type="slidenum">
+              <a:rPr lang="en-US" smtClean="0"/>
+              <a:t>8</a:t>
+            </a:fld>
+            <a:endParaRPr lang="en-US"/>
+          </a:p>
+        </p:txBody>
+      </p:sp>
+    </p:spTree>
+    <p:extLst>
+      <p:ext uri="{BB962C8B-B14F-4D97-AF65-F5344CB8AC3E}">
+        <p14:creationId xmlns:p14="http://schemas.microsoft.com/office/powerpoint/2010/main" val="2803572812"/>
+      </p:ext>
+    </p:extLst>
+  </p:cSld>
+  <p:clrMapOvr>
+    <a:masterClrMapping/>
+  </p:clrMapOvr>
+</p:notes>
+</file>
+
+<file path=ppt/notesSlides/notesSlide9.xml><?xml version="1.0" encoding="utf-8"?>
+<p:notes xmlns:a="http://schemas.openxmlformats.org/drawingml/2006/main" xmlns:r="http://schemas.openxmlformats.org/officeDocument/2006/relationships" xmlns:p="http://schemas.openxmlformats.org/presentationml/2006/main">
+  <p:cSld>
+    <p:spTree>
+      <p:nvGrpSpPr>
+        <p:cNvPr id="1" name=""/>
+        <p:cNvGrpSpPr/>
+        <p:nvPr/>
+      </p:nvGrpSpPr>
+      <p:grpSpPr>
+        <a:xfrm>
+          <a:off x="0" y="0"/>
+          <a:ext cx="0" cy="0"/>
+          <a:chOff x="0" y="0"/>
+          <a:chExt cx="0" cy="0"/>
+        </a:xfrm>
+      </p:grpSpPr>
+      <p:sp>
+        <p:nvSpPr>
+          <p:cNvPr id="2" name="Slide Image Placeholder 1"/>
+          <p:cNvSpPr>
+            <a:spLocks noGrp="1" noRot="1" noChangeAspect="1"/>
+          </p:cNvSpPr>
+          <p:nvPr>
+            <p:ph type="sldImg"/>
+          </p:nvPr>
+        </p:nvSpPr>
+        <p:spPr/>
+      </p:sp>
+      <p:sp>
+        <p:nvSpPr>
+          <p:cNvPr id="3" name="Notes Placeholder 2"/>
+          <p:cNvSpPr>
+            <a:spLocks noGrp="1"/>
+          </p:cNvSpPr>
+          <p:nvPr>
+            <p:ph type="body" idx="1"/>
+          </p:nvPr>
+        </p:nvSpPr>
+        <p:spPr/>
+        <p:txBody>
+          <a:bodyPr/>
+          <a:lstStyle/>
+          <a:p>
+            <a:endParaRPr lang="en-US" dirty="0"/>
+          </a:p>
+        </p:txBody>
+      </p:sp>
+      <p:sp>
+        <p:nvSpPr>
+          <p:cNvPr id="4" name="Slide Number Placeholder 3"/>
+          <p:cNvSpPr>
+            <a:spLocks noGrp="1"/>
+          </p:cNvSpPr>
+          <p:nvPr>
+            <p:ph type="sldNum" sz="quarter" idx="5"/>
+          </p:nvPr>
+        </p:nvSpPr>
+        <p:spPr/>
+        <p:txBody>
+          <a:bodyPr/>
+          <a:lstStyle/>
+          <a:p>
+            <a:fld id="{6E02241E-2B30-4617-95D5-9BEA759A42CB}" type="slidenum">
+              <a:rPr lang="en-US" smtClean="0"/>
+              <a:t>9</a:t>
+            </a:fld>
+            <a:endParaRPr lang="en-US"/>
+          </a:p>
+        </p:txBody>
+      </p:sp>
+    </p:spTree>
+    <p:extLst>
+      <p:ext uri="{BB962C8B-B14F-4D97-AF65-F5344CB8AC3E}">
+        <p14:creationId xmlns:p14="http://schemas.microsoft.com/office/powerpoint/2010/main" val="3660692297"/>
+      </p:ext>
+    </p:extLst>
+  </p:cSld>
+  <p:clrMapOvr>
+    <a:masterClrMapping/>
+  </p:clrMapOvr>
+</p:notes>
+</file>
+
 <file path=ppt/slideLayouts/slideLayout1.xml><?xml version="1.0" encoding="utf-8"?>
 <p:sldLayout xmlns:a="http://schemas.openxmlformats.org/drawingml/2006/main" xmlns:r="http://schemas.openxmlformats.org/officeDocument/2006/relationships" xmlns:p="http://schemas.openxmlformats.org/presentationml/2006/main" showMasterSp="0" type="title" preserve="1">
   <p:cSld name="Title Slide">
@@ -458,7 +1635,7 @@
             <a:fld id="{5923F103-BC34-4FE4-A40E-EDDEECFDA5D0}" type="datetimeFigureOut">
               <a:rPr lang="en-US" dirty="0"/>
               <a:pPr/>
-              <a:t>12/4/22</a:t>
+              <a:t>12/7/22</a:t>
             </a:fld>
             <a:endParaRPr lang="en-US" dirty="0"/>
           </a:p>
@@ -1542,7 +2719,7 @@
           <a:p>
             <a:fld id="{923A1CC3-2375-41D4-9E03-427CAF2A4C1A}" type="datetimeFigureOut">
               <a:rPr lang="en-US" dirty="0"/>
-              <a:t>12/4/22</a:t>
+              <a:t>12/7/22</a:t>
             </a:fld>
             <a:endParaRPr lang="en-US" dirty="0"/>
           </a:p>
@@ -2518,7 +3695,7 @@
           <a:p>
             <a:fld id="{AFF16868-8199-4C2C-A5B1-63AEE139F88E}" type="datetimeFigureOut">
               <a:rPr lang="en-US" dirty="0"/>
-              <a:t>12/4/22</a:t>
+              <a:t>12/7/22</a:t>
             </a:fld>
             <a:endParaRPr lang="en-US" dirty="0"/>
           </a:p>
@@ -3648,7 +4825,7 @@
           <a:p>
             <a:fld id="{AAD9FF7F-6988-44CC-821B-644E70CD2F73}" type="datetimeFigureOut">
               <a:rPr lang="en-US" dirty="0"/>
-              <a:t>12/4/22</a:t>
+              <a:t>12/7/22</a:t>
             </a:fld>
             <a:endParaRPr lang="en-US" dirty="0"/>
           </a:p>
@@ -4677,7 +5854,7 @@
           <a:p>
             <a:fld id="{5C12C299-16B2-4475-990D-751901EACC14}" type="datetimeFigureOut">
               <a:rPr lang="en-US" dirty="0"/>
-              <a:t>12/4/22</a:t>
+              <a:t>12/7/22</a:t>
             </a:fld>
             <a:endParaRPr lang="en-US" dirty="0"/>
           </a:p>
@@ -5333,7 +6510,7 @@
           <a:p>
             <a:fld id="{9FE86839-B9D8-4651-8783-F325ECE74E65}" type="datetimeFigureOut">
               <a:rPr lang="en-US" dirty="0"/>
-              <a:t>12/4/22</a:t>
+              <a:t>12/7/22</a:t>
             </a:fld>
             <a:endParaRPr lang="en-US" dirty="0"/>
           </a:p>
@@ -6190,7 +7367,7 @@
           <a:p>
             <a:fld id="{FD484F64-32F6-45C5-931F-ADC1662401D0}" type="datetimeFigureOut">
               <a:rPr lang="en-US" dirty="0"/>
-              <a:t>12/4/22</a:t>
+              <a:t>12/7/22</a:t>
             </a:fld>
             <a:endParaRPr lang="en-US" dirty="0"/>
           </a:p>
@@ -6376,7 +7553,7 @@
           <a:p>
             <a:fld id="{53086D93-FCAC-47E0-A2EE-787E62CA814C}" type="datetimeFigureOut">
               <a:rPr lang="en-US" dirty="0"/>
-              <a:t>12/4/22</a:t>
+              <a:t>12/7/22</a:t>
             </a:fld>
             <a:endParaRPr lang="en-US" dirty="0"/>
           </a:p>
@@ -7344,7 +8521,7 @@
           <a:p>
             <a:fld id="{CDA879A6-0FD0-4734-A311-86BFCA472E6E}" type="datetimeFigureOut">
               <a:rPr lang="en-US" dirty="0"/>
-              <a:t>12/4/22</a:t>
+              <a:t>12/7/22</a:t>
             </a:fld>
             <a:endParaRPr lang="en-US" dirty="0"/>
           </a:p>
@@ -7551,7 +8728,7 @@
           <a:p>
             <a:fld id="{19C9CA7B-DFD4-44B5-8C60-D14B8CD1FB59}" type="datetimeFigureOut">
               <a:rPr lang="en-US" dirty="0"/>
-              <a:t>12/4/22</a:t>
+              <a:t>12/7/22</a:t>
             </a:fld>
             <a:endParaRPr lang="en-US" dirty="0"/>
           </a:p>
@@ -8581,7 +9758,7 @@
           <a:p>
             <a:fld id="{F34E6425-0181-43F2-84FC-787E803FD2F8}" type="datetimeFigureOut">
               <a:rPr lang="en-US" dirty="0"/>
-              <a:t>12/4/22</a:t>
+              <a:t>12/7/22</a:t>
             </a:fld>
             <a:endParaRPr lang="en-US" dirty="0"/>
           </a:p>
@@ -8849,7 +10026,7 @@
           <a:p>
             <a:fld id="{3BDB8791-F1B0-41E7-B7FD-A781E65C4266}" type="datetimeFigureOut">
               <a:rPr lang="en-US" dirty="0"/>
-              <a:t>12/4/22</a:t>
+              <a:t>12/7/22</a:t>
             </a:fld>
             <a:endParaRPr lang="en-US" dirty="0"/>
           </a:p>
@@ -9255,7 +10432,7 @@
           <a:p>
             <a:fld id="{5FDD63B2-E120-4ED8-B27B-C685F510A5FE}" type="datetimeFigureOut">
               <a:rPr lang="en-US" dirty="0"/>
-              <a:t>12/4/22</a:t>
+              <a:t>12/7/22</a:t>
             </a:fld>
             <a:endParaRPr lang="en-US" dirty="0"/>
           </a:p>
@@ -9378,7 +10555,7 @@
           <a:p>
             <a:fld id="{7AA18ACC-A947-437B-A130-35BD54FDF1E9}" type="datetimeFigureOut">
               <a:rPr lang="en-US" dirty="0"/>
-              <a:t>12/4/22</a:t>
+              <a:t>12/7/22</a:t>
             </a:fld>
             <a:endParaRPr lang="en-US" dirty="0"/>
           </a:p>
@@ -9469,7 +10646,7 @@
           <a:p>
             <a:fld id="{7C8D7E02-BCB8-4D50-A234-369438C08659}" type="datetimeFigureOut">
               <a:rPr lang="en-US" dirty="0"/>
-              <a:t>12/4/22</a:t>
+              <a:t>12/7/22</a:t>
             </a:fld>
             <a:endParaRPr lang="en-US" dirty="0"/>
           </a:p>
@@ -10546,7 +11723,7 @@
           <a:p>
             <a:fld id="{76E86A4C-8E40-4F87-A4F0-01A0687C5742}" type="datetimeFigureOut">
               <a:rPr lang="en-US" dirty="0"/>
-              <a:t>12/4/22</a:t>
+              <a:t>12/7/22</a:t>
             </a:fld>
             <a:endParaRPr lang="en-US" dirty="0"/>
           </a:p>
@@ -11650,7 +12827,7 @@
           <a:p>
             <a:fld id="{35E72C73-2D91-4E12-BA25-F0AA0C03599B}" type="datetimeFigureOut">
               <a:rPr lang="en-US" dirty="0"/>
-              <a:t>12/4/22</a:t>
+              <a:t>12/7/22</a:t>
             </a:fld>
             <a:endParaRPr lang="en-US" dirty="0"/>
           </a:p>
@@ -12643,7 +13820,7 @@
           <a:p>
             <a:fld id="{2BE451C3-0FF4-47C4-B829-773ADF60F88C}" type="datetimeFigureOut">
               <a:rPr lang="en-US" dirty="0"/>
-              <a:t>12/4/22</a:t>
+              <a:t>12/7/22</a:t>
             </a:fld>
             <a:endParaRPr lang="en-US" dirty="0"/>
           </a:p>
@@ -13794,7 +14971,7 @@
                 <a:latin typeface="Calibri"/>
                 <a:ea typeface="+mn-lt"/>
                 <a:cs typeface="+mn-lt"/>
-                <a:hlinkClick r:id="rId2"/>
+                <a:hlinkClick r:id="rId3"/>
               </a:rPr>
               <a:t>hitesh2@illinois.edu</a:t>
             </a:r>
@@ -13806,7 +14983,7 @@
               </a:rPr>
               <a:t>)</a:t>
             </a:r>
-            <a:endParaRPr lang="en-US">
+            <a:endParaRPr lang="en-US" dirty="0">
               <a:latin typeface="Calibri"/>
               <a:cs typeface="Calibri"/>
             </a:endParaRPr>
@@ -13848,7 +15025,7 @@
                 <a:latin typeface="Calibri"/>
                 <a:ea typeface="+mn-lt"/>
                 <a:cs typeface="+mn-lt"/>
-                <a:hlinkClick r:id="rId3"/>
+                <a:hlinkClick r:id="rId4"/>
               </a:rPr>
               <a:t>gs25@illinois.edu</a:t>
             </a:r>
@@ -13882,7 +15059,7 @@
                 <a:latin typeface="Calibri"/>
                 <a:ea typeface="+mn-lt"/>
                 <a:cs typeface="+mn-lt"/>
-                <a:hlinkClick r:id="rId4"/>
+                <a:hlinkClick r:id="rId5"/>
               </a:rPr>
               <a:t>sb59@illinois.edu</a:t>
             </a:r>
@@ -13916,7 +15093,7 @@
                 <a:latin typeface="Calibri"/>
                 <a:ea typeface="+mn-lt"/>
                 <a:cs typeface="+mn-lt"/>
-                <a:hlinkClick r:id="rId5"/>
+                <a:hlinkClick r:id="rId6"/>
               </a:rPr>
               <a:t>chandan3@illinois.edu</a:t>
             </a:r>
@@ -13958,7 +15135,7 @@
                 <a:latin typeface="Calibri"/>
                 <a:ea typeface="+mn-lt"/>
                 <a:cs typeface="+mn-lt"/>
-                <a:hlinkClick r:id="rId6"/>
+                <a:hlinkClick r:id="rId7"/>
               </a:rPr>
               <a:t>sksingh6@illinois.edu</a:t>
             </a:r>
@@ -13970,10 +15147,137 @@
               </a:rPr>
               <a:t>)</a:t>
             </a:r>
-            <a:endParaRPr lang="en-US">
+            <a:endParaRPr lang="en-US" dirty="0">
               <a:latin typeface="Calibri"/>
               <a:cs typeface="Calibri"/>
             </a:endParaRPr>
+          </a:p>
+        </p:txBody>
+      </p:sp>
+      <p:sp>
+        <p:nvSpPr>
+          <p:cNvPr id="4" name="Title 1">
+            <a:extLst>
+              <a:ext uri="{FF2B5EF4-FFF2-40B4-BE49-F238E27FC236}">
+                <a16:creationId xmlns:a16="http://schemas.microsoft.com/office/drawing/2014/main" id="{B258B882-19D5-682A-BB6A-02A55FD4F20A}"/>
+              </a:ext>
+            </a:extLst>
+          </p:cNvPr>
+          <p:cNvSpPr txBox="1">
+            <a:spLocks/>
+          </p:cNvSpPr>
+          <p:nvPr/>
+        </p:nvSpPr>
+        <p:spPr bwMode="gray">
+          <a:xfrm>
+            <a:off x="1612154" y="3289301"/>
+            <a:ext cx="8825658" cy="967910"/>
+          </a:xfrm>
+          <a:prstGeom prst="rect">
+            <a:avLst/>
+          </a:prstGeom>
+        </p:spPr>
+        <p:txBody>
+          <a:bodyPr vert="horz" lIns="91440" tIns="45720" rIns="91440" bIns="45720" rtlCol="0" anchor="ctr">
+            <a:normAutofit fontScale="85000" lnSpcReduction="20000"/>
+          </a:bodyPr>
+          <a:lstStyle>
+            <a:lvl1pPr algn="l" defTabSz="457200" rtl="0" eaLnBrk="1" latinLnBrk="0" hangingPunct="1">
+              <a:spcBef>
+                <a:spcPct val="0"/>
+              </a:spcBef>
+              <a:buNone/>
+              <a:defRPr sz="5400" b="0" i="0" kern="1200">
+                <a:solidFill>
+                  <a:schemeClr val="bg2"/>
+                </a:solidFill>
+                <a:latin typeface="+mj-lt"/>
+                <a:ea typeface="+mj-ea"/>
+                <a:cs typeface="+mj-cs"/>
+              </a:defRPr>
+            </a:lvl1pPr>
+            <a:lvl2pPr eaLnBrk="1" hangingPunct="1">
+              <a:defRPr>
+                <a:solidFill>
+                  <a:schemeClr val="tx2"/>
+                </a:solidFill>
+              </a:defRPr>
+            </a:lvl2pPr>
+            <a:lvl3pPr eaLnBrk="1" hangingPunct="1">
+              <a:defRPr>
+                <a:solidFill>
+                  <a:schemeClr val="tx2"/>
+                </a:solidFill>
+              </a:defRPr>
+            </a:lvl3pPr>
+            <a:lvl4pPr eaLnBrk="1" hangingPunct="1">
+              <a:defRPr>
+                <a:solidFill>
+                  <a:schemeClr val="tx2"/>
+                </a:solidFill>
+              </a:defRPr>
+            </a:lvl4pPr>
+            <a:lvl5pPr eaLnBrk="1" hangingPunct="1">
+              <a:defRPr>
+                <a:solidFill>
+                  <a:schemeClr val="tx2"/>
+                </a:solidFill>
+              </a:defRPr>
+            </a:lvl5pPr>
+            <a:lvl6pPr eaLnBrk="1" hangingPunct="1">
+              <a:defRPr>
+                <a:solidFill>
+                  <a:schemeClr val="tx2"/>
+                </a:solidFill>
+              </a:defRPr>
+            </a:lvl6pPr>
+            <a:lvl7pPr eaLnBrk="1" hangingPunct="1">
+              <a:defRPr>
+                <a:solidFill>
+                  <a:schemeClr val="tx2"/>
+                </a:solidFill>
+              </a:defRPr>
+            </a:lvl7pPr>
+            <a:lvl8pPr eaLnBrk="1" hangingPunct="1">
+              <a:defRPr>
+                <a:solidFill>
+                  <a:schemeClr val="tx2"/>
+                </a:solidFill>
+              </a:defRPr>
+            </a:lvl8pPr>
+            <a:lvl9pPr eaLnBrk="1" hangingPunct="1">
+              <a:defRPr>
+                <a:solidFill>
+                  <a:schemeClr val="tx2"/>
+                </a:solidFill>
+              </a:defRPr>
+            </a:lvl9pPr>
+          </a:lstStyle>
+          <a:p>
+            <a:pPr algn="ctr"/>
+            <a:r>
+              <a:rPr lang="en-US" sz="4000" dirty="0">
+                <a:solidFill>
+                  <a:srgbClr val="FFFFFF"/>
+                </a:solidFill>
+                <a:latin typeface="Calibri"/>
+                <a:cs typeface="Calibri"/>
+              </a:rPr>
+              <a:t>Text Information Systems</a:t>
+            </a:r>
+          </a:p>
+          <a:p>
+            <a:pPr algn="ctr"/>
+            <a:r>
+              <a:rPr lang="en-US" sz="4000" dirty="0">
+                <a:solidFill>
+                  <a:srgbClr val="FFFFFF"/>
+                </a:solidFill>
+                <a:latin typeface="Calibri"/>
+                <a:cs typeface="Calibri"/>
+              </a:rPr>
+              <a:t>Fall 2022 Final Project Presentation</a:t>
+            </a:r>
           </a:p>
         </p:txBody>
       </p:sp>
@@ -13987,6 +15291,14 @@
   <p:clrMapOvr>
     <a:masterClrMapping/>
   </p:clrMapOvr>
+  <mc:AlternateContent xmlns:mc="http://schemas.openxmlformats.org/markup-compatibility/2006" xmlns:p14="http://schemas.microsoft.com/office/powerpoint/2010/main">
+    <mc:Choice Requires="p14">
+      <p:transition spd="slow" p14:dur="2000" advTm="23256"/>
+    </mc:Choice>
+    <mc:Fallback xmlns="">
+      <p:transition spd="slow" advTm="23256"/>
+    </mc:Fallback>
+  </mc:AlternateContent>
   <p:timing>
     <p:tnLst>
       <p:par>
@@ -14048,6 +15360,44 @@
                                   </p:childTnLst>
                                 </p:cTn>
                               </p:par>
+                              <p:par>
+                                <p:cTn id="8" presetID="10" presetClass="entr" presetSubtype="0" fill="hold" grpId="0" nodeType="withEffect">
+                                  <p:stCondLst>
+                                    <p:cond delay="500"/>
+                                  </p:stCondLst>
+                                  <p:iterate>
+                                    <p:tmPct val="10000"/>
+                                  </p:iterate>
+                                  <p:childTnLst>
+                                    <p:set>
+                                      <p:cBhvr>
+                                        <p:cTn id="9" dur="1" fill="hold">
+                                          <p:stCondLst>
+                                            <p:cond delay="0"/>
+                                          </p:stCondLst>
+                                        </p:cTn>
+                                        <p:tgtEl>
+                                          <p:spTgt spid="4"/>
+                                        </p:tgtEl>
+                                        <p:attrNameLst>
+                                          <p:attrName>style.visibility</p:attrName>
+                                        </p:attrNameLst>
+                                      </p:cBhvr>
+                                      <p:to>
+                                        <p:strVal val="visible"/>
+                                      </p:to>
+                                    </p:set>
+                                    <p:animEffect transition="in" filter="fade">
+                                      <p:cBhvr>
+                                        <p:cTn id="10" dur="700"/>
+                                        <p:tgtEl>
+                                          <p:spTgt spid="4"/>
+                                        </p:tgtEl>
+                                      </p:cBhvr>
+                                    </p:animEffect>
+                                  </p:childTnLst>
+                                </p:cTn>
+                              </p:par>
                             </p:childTnLst>
                           </p:cTn>
                         </p:par>
@@ -14077,6 +15427,7 @@
     </p:tnLst>
     <p:bldLst>
       <p:bldP spid="2" grpId="0"/>
+      <p:bldP spid="4" grpId="0"/>
     </p:bldLst>
   </p:timing>
 </p:sld>
@@ -14614,8 +15965,8 @@
         </p:nvSpPr>
         <p:spPr>
           <a:xfrm>
-            <a:off x="6849687" y="2493818"/>
-            <a:ext cx="4460627" cy="1319310"/>
+            <a:off x="5799815" y="2718033"/>
+            <a:ext cx="5393053" cy="1845578"/>
           </a:xfrm>
         </p:spPr>
         <p:txBody>
@@ -14625,7 +15976,7 @@
           <a:lstStyle/>
           <a:p>
             <a:r>
-              <a:rPr lang="en-US" sz="5400" b="0" i="0" kern="1200" dirty="0">
+              <a:rPr lang="en-US" sz="2800" b="0" i="0" kern="1200" dirty="0">
                 <a:solidFill>
                   <a:srgbClr val="EBEBEB"/>
                 </a:solidFill>
@@ -14633,8 +15984,38 @@
                 <a:ea typeface="+mj-ea"/>
                 <a:cs typeface="+mj-cs"/>
               </a:rPr>
-              <a:t>Demo</a:t>
-            </a:r>
+              <a:t>Demo </a:t>
+            </a:r>
+            <a:r>
+              <a:rPr lang="en-US" sz="2800" b="0" i="0" kern="1200" dirty="0">
+                <a:solidFill>
+                  <a:srgbClr val="EBEBEB"/>
+                </a:solidFill>
+                <a:latin typeface="+mj-lt"/>
+                <a:ea typeface="+mj-ea"/>
+                <a:cs typeface="+mj-cs"/>
+                <a:hlinkClick r:id="rId3"/>
+              </a:rPr>
+              <a:t>https://mediaspace.illinois.edu/media/t/1_ulbtkacf</a:t>
+            </a:r>
+            <a:br>
+              <a:rPr lang="en-US" sz="2800" b="0" i="0" kern="1200" dirty="0">
+                <a:solidFill>
+                  <a:srgbClr val="EBEBEB"/>
+                </a:solidFill>
+                <a:latin typeface="+mj-lt"/>
+                <a:ea typeface="+mj-ea"/>
+                <a:cs typeface="+mj-cs"/>
+              </a:rPr>
+            </a:br>
+            <a:endParaRPr lang="en-US" sz="2800" b="0" i="0" kern="1200" dirty="0">
+              <a:solidFill>
+                <a:srgbClr val="EBEBEB"/>
+              </a:solidFill>
+              <a:latin typeface="+mj-lt"/>
+              <a:ea typeface="+mj-ea"/>
+              <a:cs typeface="+mj-cs"/>
+            </a:endParaRPr>
           </a:p>
         </p:txBody>
       </p:sp>
@@ -14706,13 +16087,13 @@
           <p:nvPr/>
         </p:nvPicPr>
         <p:blipFill>
-          <a:blip r:embed="rId3">
+          <a:blip r:embed="rId4">
             <a:extLst>
               <a:ext uri="{28A0092B-C50C-407E-A947-70E740481C1C}">
                 <a14:useLocalDpi xmlns:a14="http://schemas.microsoft.com/office/drawing/2010/main" val="0"/>
               </a:ext>
               <a:ext uri="{96DAC541-7B7A-43D3-8B79-37D633B846F1}">
-                <asvg:svgBlip xmlns:asvg="http://schemas.microsoft.com/office/drawing/2016/SVG/main" r:embed="rId4"/>
+                <asvg:svgBlip xmlns:asvg="http://schemas.microsoft.com/office/drawing/2016/SVG/main" r:embed="rId5"/>
               </a:ext>
             </a:extLst>
           </a:blip>
@@ -14774,7 +16155,7 @@
           <p:cNvPr id="2" name="Title 1">
             <a:extLst>
               <a:ext uri="{FF2B5EF4-FFF2-40B4-BE49-F238E27FC236}">
-                <a16:creationId xmlns:a16="http://schemas.microsoft.com/office/drawing/2014/main" id="{D3A0FF0D-55B8-D3CB-B28B-34B5D07E5DC9}"/>
+                <a16:creationId xmlns:a16="http://schemas.microsoft.com/office/drawing/2014/main" id="{4492AD3C-E603-5648-0616-4E404EC03372}"/>
               </a:ext>
             </a:extLst>
           </p:cNvPr>
@@ -14792,7 +16173,7 @@
           <a:p>
             <a:r>
               <a:rPr lang="en-US" dirty="0"/>
-              <a:t>Problem</a:t>
+              <a:t>Agenda</a:t>
             </a:r>
           </a:p>
         </p:txBody>
@@ -14802,7 +16183,7 @@
           <p:cNvPr id="3" name="Content Placeholder 2">
             <a:extLst>
               <a:ext uri="{FF2B5EF4-FFF2-40B4-BE49-F238E27FC236}">
-                <a16:creationId xmlns:a16="http://schemas.microsoft.com/office/drawing/2014/main" id="{6384A661-7E1C-ED6D-2336-2EAE3C94EC51}"/>
+                <a16:creationId xmlns:a16="http://schemas.microsoft.com/office/drawing/2014/main" id="{A2EEEA09-9EDD-3C1E-D8FB-D306F5D2D00C}"/>
               </a:ext>
             </a:extLst>
           </p:cNvPr>
@@ -14815,75 +16196,57 @@
         </p:nvSpPr>
         <p:spPr/>
         <p:txBody>
-          <a:bodyPr vert="horz" lIns="91440" tIns="45720" rIns="91440" bIns="45720" rtlCol="0" anchor="t">
-            <a:normAutofit/>
-          </a:bodyPr>
+          <a:bodyPr/>
           <a:lstStyle/>
           <a:p>
             <a:r>
-              <a:rPr lang="en-US" sz="1400" dirty="0">
-                <a:latin typeface="Calibri"/>
-                <a:ea typeface="+mn-lt"/>
-                <a:cs typeface="+mn-lt"/>
-              </a:rPr>
-              <a:t>A tweet is a post on Twitter. Tweets can be up to 140 characters long, including spaces, and can include URLs and hashtags.</a:t>
-            </a:r>
-          </a:p>
-          <a:p>
-            <a:endParaRPr lang="en-US" sz="1400" dirty="0">
-              <a:latin typeface="Calibri"/>
-              <a:ea typeface="+mn-lt"/>
-              <a:cs typeface="+mn-lt"/>
-            </a:endParaRPr>
-          </a:p>
-          <a:p>
-            <a:r>
-              <a:rPr lang="en-US" sz="1400" dirty="0">
-                <a:latin typeface="Calibri"/>
-                <a:ea typeface="+mn-lt"/>
-                <a:cs typeface="+mn-lt"/>
-              </a:rPr>
-              <a:t>Twitter messages include sarcasm, slang, irony, jargon contraction of existing words, abbreviations, acronyms, amplifications, new words, emoticons and various types of punctuation.</a:t>
-            </a:r>
-          </a:p>
-          <a:p>
-            <a:pPr marL="0" indent="0">
-              <a:buNone/>
-            </a:pPr>
-            <a:br>
-              <a:rPr lang="en-US" sz="1400" dirty="0">
-                <a:latin typeface="Calibri"/>
-                <a:ea typeface="+mn-lt"/>
-                <a:cs typeface="+mn-lt"/>
-              </a:rPr>
-            </a:br>
-            <a:endParaRPr lang="en-US" sz="1400" dirty="0">
-              <a:latin typeface="Calibri"/>
-              <a:ea typeface="+mn-lt"/>
-              <a:cs typeface="+mn-lt"/>
-            </a:endParaRPr>
-          </a:p>
-          <a:p>
-            <a:r>
-              <a:rPr lang="en-US" sz="1400" dirty="0">
-                <a:latin typeface="Calibri"/>
-                <a:ea typeface="+mn-lt"/>
-                <a:cs typeface="+mn-lt"/>
-              </a:rPr>
-              <a:t>With such complexity of the text data we need some well-developed methodology for the classification of texts at various levels (tweet, sentence, blog, document etc.) according to their attitude polarity, or affect and emotion content(Ref: https://www.sciencedirect.com/science/article/pii/S0166361520305339)</a:t>
-            </a:r>
-            <a:endParaRPr lang="en-US" sz="1400" dirty="0">
-              <a:latin typeface="Calibri"/>
-            </a:endParaRPr>
-          </a:p>
-          <a:p>
-            <a:pPr>
-              <a:spcBef>
-                <a:spcPts val="0"/>
-              </a:spcBef>
-              <a:buFont typeface="Wingdings" charset="2"/>
-              <a:buChar char="Ø"/>
-            </a:pPr>
+              <a:rPr lang="en-US" dirty="0"/>
+              <a:t>Overview</a:t>
+            </a:r>
+          </a:p>
+          <a:p>
+            <a:r>
+              <a:rPr lang="en-US" dirty="0"/>
+              <a:t>Data</a:t>
+            </a:r>
+          </a:p>
+          <a:p>
+            <a:r>
+              <a:rPr lang="en-US" dirty="0"/>
+              <a:t>Model Comparison and Evaluation</a:t>
+            </a:r>
+          </a:p>
+          <a:p>
+            <a:r>
+              <a:rPr lang="en-US" dirty="0"/>
+              <a:t>High Level Architecture</a:t>
+            </a:r>
+          </a:p>
+          <a:p>
+            <a:r>
+              <a:rPr lang="en-US" dirty="0"/>
+              <a:t>High Level Code Walkthrough</a:t>
+            </a:r>
+          </a:p>
+          <a:p>
+            <a:r>
+              <a:rPr lang="en-US" dirty="0"/>
+              <a:t>How to run the application?</a:t>
+            </a:r>
+          </a:p>
+          <a:p>
+            <a:r>
+              <a:rPr lang="en-US" dirty="0"/>
+              <a:t>Demo</a:t>
+            </a:r>
+          </a:p>
+          <a:p>
+            <a:endParaRPr lang="en-US" dirty="0"/>
+          </a:p>
+          <a:p>
+            <a:endParaRPr lang="en-US" dirty="0"/>
+          </a:p>
+          <a:p>
             <a:endParaRPr lang="en-US" dirty="0"/>
           </a:p>
         </p:txBody>
@@ -14891,13 +16254,21 @@
     </p:spTree>
     <p:extLst>
       <p:ext uri="{BB962C8B-B14F-4D97-AF65-F5344CB8AC3E}">
-        <p14:creationId xmlns:p14="http://schemas.microsoft.com/office/powerpoint/2010/main" val="2895769363"/>
+        <p14:creationId xmlns:p14="http://schemas.microsoft.com/office/powerpoint/2010/main" val="2009469896"/>
       </p:ext>
     </p:extLst>
   </p:cSld>
   <p:clrMapOvr>
     <a:masterClrMapping/>
   </p:clrMapOvr>
+  <mc:AlternateContent xmlns:mc="http://schemas.openxmlformats.org/markup-compatibility/2006" xmlns:p14="http://schemas.microsoft.com/office/powerpoint/2010/main">
+    <mc:Choice Requires="p14">
+      <p:transition spd="slow" p14:dur="2000" advTm="39532"/>
+    </mc:Choice>
+    <mc:Fallback xmlns="">
+      <p:transition spd="slow" advTm="39532"/>
+    </mc:Fallback>
+  </mc:AlternateContent>
 </p:sld>
 </file>
 
@@ -14975,16 +16346,28 @@
             <a:r>
               <a:rPr lang="en-US" sz="1400" dirty="0">
                 <a:latin typeface="Calibri"/>
-                <a:ea typeface="+mn-lt"/>
-                <a:cs typeface="+mn-lt"/>
+                <a:cs typeface="Calibri"/>
               </a:rPr>
-              <a:t>Sentiment analysis refers to identifying as well as classifying the sentiments that are expressed in the text source. Texts are classified as positive, negative or neutral. </a:t>
-            </a:r>
-            <a:endParaRPr lang="en-US" sz="1400" dirty="0">
-              <a:latin typeface="Calibri"/>
-              <a:ea typeface="+mn-lt"/>
-              <a:cs typeface="Calibri"/>
-            </a:endParaRPr>
+              <a:t>What is Sentiment Analysis?</a:t>
+            </a:r>
+          </a:p>
+          <a:p>
+            <a:r>
+              <a:rPr lang="en-US" sz="1400" dirty="0">
+                <a:latin typeface="Calibri"/>
+                <a:cs typeface="Calibri"/>
+              </a:rPr>
+              <a:t>Sentiment Analysis of Tweets</a:t>
+            </a:r>
+          </a:p>
+          <a:p>
+            <a:r>
+              <a:rPr lang="en-US" sz="1400" dirty="0">
+                <a:latin typeface="Calibri"/>
+                <a:cs typeface="Calibri"/>
+              </a:rPr>
+              <a:t>Motivation</a:t>
+            </a:r>
           </a:p>
           <a:p>
             <a:endParaRPr lang="en-US" sz="1400" dirty="0">
@@ -14993,52 +16376,61 @@
             </a:endParaRPr>
           </a:p>
           <a:p>
-            <a:r>
-              <a:rPr lang="en-US" sz="1400" dirty="0">
-                <a:latin typeface="Calibri"/>
-                <a:ea typeface="+mn-lt"/>
-                <a:cs typeface="+mn-lt"/>
-              </a:rPr>
-              <a:t>The application developed allows user to enter a text on the screen and computationally determines the sentiment of the tweet for the intended audience .</a:t>
-            </a:r>
-            <a:endParaRPr lang="en-US" sz="1400">
-              <a:latin typeface="Calibri"/>
-              <a:ea typeface="+mn-lt"/>
-              <a:cs typeface="Calibri"/>
-            </a:endParaRPr>
-          </a:p>
-          <a:p>
             <a:endParaRPr lang="en-US" sz="1400" dirty="0">
               <a:latin typeface="Calibri"/>
               <a:cs typeface="Calibri"/>
             </a:endParaRPr>
           </a:p>
-          <a:p>
-            <a:r>
-              <a:rPr lang="en-US" sz="1400" dirty="0">
-                <a:latin typeface="Calibri"/>
-                <a:ea typeface="+mn-lt"/>
-                <a:cs typeface="+mn-lt"/>
-              </a:rPr>
-              <a:t>This tool can be used by different stake holders in overviewing the sentiments for a specific objective and understanding the generic opinion trend </a:t>
-            </a:r>
-            <a:endParaRPr lang="en-US" sz="1400">
-              <a:latin typeface="Calibri"/>
-              <a:cs typeface="Calibri"/>
-            </a:endParaRPr>
-          </a:p>
         </p:txBody>
       </p:sp>
+      <p:pic>
+        <p:nvPicPr>
+          <p:cNvPr id="5" name="Picture 4" descr="Diagram, text&#10;&#10;Description automatically generated">
+            <a:extLst>
+              <a:ext uri="{FF2B5EF4-FFF2-40B4-BE49-F238E27FC236}">
+                <a16:creationId xmlns:a16="http://schemas.microsoft.com/office/drawing/2014/main" id="{B088DBC5-4E30-5149-8D3F-0F890F7DCCA6}"/>
+              </a:ext>
+            </a:extLst>
+          </p:cNvPr>
+          <p:cNvPicPr>
+            <a:picLocks noChangeAspect="1"/>
+          </p:cNvPicPr>
+          <p:nvPr/>
+        </p:nvPicPr>
+        <p:blipFill>
+          <a:blip r:embed="rId3"/>
+          <a:stretch>
+            <a:fillRect/>
+          </a:stretch>
+        </p:blipFill>
+        <p:spPr>
+          <a:xfrm>
+            <a:off x="5669383" y="2552700"/>
+            <a:ext cx="5778500" cy="2286000"/>
+          </a:xfrm>
+          <a:prstGeom prst="rect">
+            <a:avLst/>
+          </a:prstGeom>
+        </p:spPr>
+      </p:pic>
     </p:spTree>
     <p:extLst>
       <p:ext uri="{BB962C8B-B14F-4D97-AF65-F5344CB8AC3E}">
-        <p14:creationId xmlns:p14="http://schemas.microsoft.com/office/powerpoint/2010/main" val="2282236634"/>
+        <p14:creationId xmlns:p14="http://schemas.microsoft.com/office/powerpoint/2010/main" val="3355218483"/>
       </p:ext>
     </p:extLst>
   </p:cSld>
   <p:clrMapOvr>
     <a:masterClrMapping/>
   </p:clrMapOvr>
+  <mc:AlternateContent xmlns:mc="http://schemas.openxmlformats.org/markup-compatibility/2006" xmlns:p14="http://schemas.microsoft.com/office/powerpoint/2010/main">
+    <mc:Choice Requires="p14">
+      <p:transition spd="slow" p14:dur="2000" advTm="155072"/>
+    </mc:Choice>
+    <mc:Fallback xmlns="">
+      <p:transition spd="slow" advTm="155072"/>
+    </mc:Fallback>
+  </mc:AlternateContent>
 </p:sld>
 </file>
 
@@ -15114,7 +16506,7 @@
               <a:rPr lang="en-US" sz="1400" dirty="0">
                 <a:latin typeface="Calibri"/>
                 <a:cs typeface="Calibri"/>
-                <a:hlinkClick r:id="rId2"/>
+                <a:hlinkClick r:id="rId3"/>
               </a:rPr>
               <a:t>Kaggle</a:t>
             </a:r>
@@ -15181,7 +16573,7 @@
               </a:rPr>
               <a:t> </a:t>
             </a:r>
-            <a:endParaRPr lang="en-US" sz="1400">
+            <a:endParaRPr lang="en-US" sz="1400" dirty="0">
               <a:latin typeface="Calibri"/>
             </a:endParaRPr>
           </a:p>
@@ -15290,7 +16682,7 @@
               </a:rPr>
               <a:t> </a:t>
             </a:r>
-            <a:endParaRPr lang="en-US"/>
+            <a:endParaRPr lang="en-US" dirty="0"/>
           </a:p>
           <a:p>
             <a:pPr>
@@ -15441,6 +16833,24 @@
   <p:clrMapOvr>
     <a:masterClrMapping/>
   </p:clrMapOvr>
+  <mc:AlternateContent xmlns:mc="http://schemas.openxmlformats.org/markup-compatibility/2006" xmlns:p14="http://schemas.microsoft.com/office/powerpoint/2010/main">
+    <mc:Choice Requires="p14">
+      <p:transition spd="slow" p14:dur="2000" advTm="72520"/>
+    </mc:Choice>
+    <mc:Fallback xmlns="">
+      <p:transition spd="slow" advTm="72520"/>
+    </mc:Fallback>
+  </mc:AlternateContent>
+  <p:extLst>
+    <p:ext uri="{E180D4A7-C9FB-4DFB-919C-405C955672EB}">
+      <p14:showEvtLst xmlns:p14="http://schemas.microsoft.com/office/powerpoint/2010/main">
+        <p14:playEvt time="138" objId="8"/>
+        <p14:stopEvt time="64451" objId="8"/>
+        <p14:playEvt time="70513" objId="8"/>
+        <p14:stopEvt time="72520" objId="8"/>
+      </p14:showEvtLst>
+    </p:ext>
+  </p:extLst>
 </p:sld>
 </file>
 
@@ -15506,7 +16916,7 @@
           </p:nvPr>
         </p:nvPicPr>
         <p:blipFill>
-          <a:blip r:embed="rId2"/>
+          <a:blip r:embed="rId3"/>
           <a:stretch>
             <a:fillRect/>
           </a:stretch>
@@ -15528,20 +16938,20 @@
   <p:clrMapOvr>
     <a:masterClrMapping/>
   </p:clrMapOvr>
+  <mc:AlternateContent xmlns:mc="http://schemas.openxmlformats.org/markup-compatibility/2006" xmlns:p14="http://schemas.microsoft.com/office/powerpoint/2010/main">
+    <mc:Choice Requires="p14">
+      <p:transition spd="slow" p14:dur="2000" advTm="61279"/>
+    </mc:Choice>
+    <mc:Fallback xmlns="">
+      <p:transition spd="slow" advTm="61279"/>
+    </mc:Fallback>
+  </mc:AlternateContent>
 </p:sld>
 </file>
 
 <file path=ppt/slides/slide7.xml><?xml version="1.0" encoding="utf-8"?>
 <p:sld xmlns:a="http://schemas.openxmlformats.org/drawingml/2006/main" xmlns:r="http://schemas.openxmlformats.org/officeDocument/2006/relationships" xmlns:p="http://schemas.openxmlformats.org/presentationml/2006/main">
   <p:cSld>
-    <p:bg>
-      <p:bgPr>
-        <a:solidFill>
-          <a:schemeClr val="bg1"/>
-        </a:solidFill>
-        <a:effectLst/>
-      </p:bgPr>
-    </p:bg>
     <p:spTree>
       <p:nvGrpSpPr>
         <p:cNvPr id="1" name=""/>
@@ -15639,7 +17049,7 @@
               </a:rPr>
               <a:t>  The order of ROC AUC Score for the models: Logistic Regression (0.73) &gt; Decision Tree Classifier (0.67) &gt; Gaussian NB (0.64) &gt; K-Neighbors Classifier (0.57) &gt; Random Forest Classifier (0.55) </a:t>
             </a:r>
-            <a:endParaRPr lang="en-US" sz="1400">
+            <a:endParaRPr lang="en-US" sz="1400" dirty="0">
               <a:latin typeface="Calibri"/>
               <a:ea typeface="+mn-lt"/>
               <a:cs typeface="Calibri"/>
@@ -15661,9 +17071,9 @@
                 <a:ea typeface="+mn-lt"/>
                 <a:cs typeface="+mn-lt"/>
               </a:rPr>
-              <a:t>Logistic Regression model preformed best with 73% chance . Therefore Logistic Regression model is used for generating our sentiment analysis</a:t>
-            </a:r>
-            <a:endParaRPr lang="en-US" sz="1400">
+              <a:t>Logistic Regression model performed best with 73% chance . Therefore, Logistic Regression model is used for generating our sentiment analysis</a:t>
+            </a:r>
+            <a:endParaRPr lang="en-US" sz="1400" dirty="0">
               <a:latin typeface="Calibri"/>
               <a:cs typeface="Calibri"/>
             </a:endParaRPr>
@@ -15685,7 +17095,7 @@
           <p:nvPr/>
         </p:nvPicPr>
         <p:blipFill>
-          <a:blip r:embed="rId2"/>
+          <a:blip r:embed="rId3"/>
           <a:stretch>
             <a:fillRect/>
           </a:stretch>
@@ -15719,6 +17129,14 @@
   <p:clrMapOvr>
     <a:masterClrMapping/>
   </p:clrMapOvr>
+  <mc:AlternateContent xmlns:mc="http://schemas.openxmlformats.org/markup-compatibility/2006" xmlns:p14="http://schemas.microsoft.com/office/powerpoint/2010/main">
+    <mc:Choice Requires="p14">
+      <p:transition spd="slow" p14:dur="2000" advTm="25824"/>
+    </mc:Choice>
+    <mc:Fallback xmlns="">
+      <p:transition spd="slow" advTm="25824"/>
+    </mc:Fallback>
+  </mc:AlternateContent>
 </p:sld>
 </file>
 
@@ -15828,7 +17246,7 @@
           <p:nvPr/>
         </p:nvPicPr>
         <p:blipFill>
-          <a:blip r:embed="rId2"/>
+          <a:blip r:embed="rId3"/>
           <a:stretch>
             <a:fillRect/>
           </a:stretch>
@@ -15935,31 +17353,31 @@
               </a:lnSpc>
             </a:pPr>
             <a:r>
-              <a:rPr lang="en" sz="1400" dirty="0">
+              <a:rPr lang="en" sz="1200" dirty="0">
                 <a:latin typeface="Calibri"/>
                 <a:ea typeface="+mn-lt"/>
                 <a:cs typeface="+mn-lt"/>
               </a:rPr>
-              <a:t>Download the code from the </a:t>
-            </a:r>
-            <a:r>
-              <a:rPr lang="en" sz="1400" dirty="0">
+              <a:t>Download the code from the GitHub </a:t>
+            </a:r>
+            <a:r>
+              <a:rPr lang="en" sz="1200" dirty="0">
                 <a:latin typeface="Calibri"/>
                 <a:ea typeface="+mn-lt"/>
                 <a:cs typeface="+mn-lt"/>
-                <a:hlinkClick r:id="rId2"/>
+                <a:hlinkClick r:id="rId3"/>
               </a:rPr>
               <a:t>link</a:t>
             </a:r>
             <a:r>
-              <a:rPr lang="en" sz="1400" dirty="0">
+              <a:rPr lang="en" sz="1200" dirty="0">
                 <a:latin typeface="Calibri"/>
                 <a:ea typeface="+mn-lt"/>
                 <a:cs typeface="+mn-lt"/>
               </a:rPr>
-              <a:t>. As shown below root directory has two folders “backend” and “frontend” </a:t>
-            </a:r>
-            <a:endParaRPr lang="en-US" sz="1400" dirty="0">
+              <a:t>. </a:t>
+            </a:r>
+            <a:endParaRPr lang="en-US" sz="1200" dirty="0">
               <a:latin typeface="Calibri"/>
               <a:ea typeface="+mn-lt"/>
               <a:cs typeface="+mn-lt"/>
@@ -15972,14 +17390,183 @@
               </a:lnSpc>
             </a:pPr>
             <a:r>
-              <a:rPr lang="en" sz="1400" dirty="0">
+              <a:rPr lang="en-US" sz="1200" dirty="0">
                 <a:latin typeface="Calibri"/>
                 <a:ea typeface="+mn-lt"/>
                 <a:cs typeface="+mn-lt"/>
               </a:rPr>
-              <a:t>“backend” folder contains the code of sentimental analysis engine while “frontend” holds UI code</a:t>
-            </a:r>
-            <a:endParaRPr lang="en-US" sz="1400" dirty="0">
+              <a:t>Run Backend Server</a:t>
+            </a:r>
+          </a:p>
+          <a:p>
+            <a:pPr lvl="1">
+              <a:lnSpc>
+                <a:spcPct val="114999"/>
+              </a:lnSpc>
+            </a:pPr>
+            <a:r>
+              <a:rPr lang="en" sz="1200" dirty="0">
+                <a:latin typeface="Calibri"/>
+                <a:ea typeface="+mn-lt"/>
+                <a:cs typeface="+mn-lt"/>
+              </a:rPr>
+              <a:t>Install the required dependencies using </a:t>
+            </a:r>
+            <a:r>
+              <a:rPr lang="en" sz="1050" dirty="0">
+                <a:solidFill>
+                  <a:schemeClr val="accent5">
+                    <a:lumMod val="75000"/>
+                  </a:schemeClr>
+                </a:solidFill>
+                <a:latin typeface="Courier" pitchFamily="2" charset="0"/>
+                <a:ea typeface="+mn-lt"/>
+                <a:cs typeface="Consolas" panose="020B0609020204030204" pitchFamily="49" charset="0"/>
+              </a:rPr>
+              <a:t>pip install -r </a:t>
+            </a:r>
+            <a:r>
+              <a:rPr lang="en" sz="1050" dirty="0" err="1">
+                <a:solidFill>
+                  <a:schemeClr val="accent5">
+                    <a:lumMod val="75000"/>
+                  </a:schemeClr>
+                </a:solidFill>
+                <a:latin typeface="Courier" pitchFamily="2" charset="0"/>
+                <a:ea typeface="+mn-lt"/>
+                <a:cs typeface="Consolas" panose="020B0609020204030204" pitchFamily="49" charset="0"/>
+              </a:rPr>
+              <a:t>requirements.txt</a:t>
+            </a:r>
+            <a:r>
+              <a:rPr lang="en" sz="1200" dirty="0">
+                <a:latin typeface="Calibri"/>
+                <a:ea typeface="+mn-lt"/>
+                <a:cs typeface="+mn-lt"/>
+              </a:rPr>
+              <a:t> </a:t>
+            </a:r>
+          </a:p>
+          <a:p>
+            <a:pPr lvl="1">
+              <a:lnSpc>
+                <a:spcPct val="114999"/>
+              </a:lnSpc>
+            </a:pPr>
+            <a:r>
+              <a:rPr lang="en" sz="1200" dirty="0">
+                <a:latin typeface="Calibri"/>
+                <a:ea typeface="+mn-lt"/>
+                <a:cs typeface="+mn-lt"/>
+              </a:rPr>
+              <a:t>Go to the directory backend </a:t>
+            </a:r>
+            <a:r>
+              <a:rPr lang="en" sz="1050" dirty="0">
+                <a:solidFill>
+                  <a:schemeClr val="accent5">
+                    <a:lumMod val="75000"/>
+                  </a:schemeClr>
+                </a:solidFill>
+                <a:latin typeface="Courier" pitchFamily="2" charset="0"/>
+                <a:ea typeface="+mn-lt"/>
+                <a:cs typeface="Consolas" panose="020B0609020204030204" pitchFamily="49" charset="0"/>
+              </a:rPr>
+              <a:t>cd backend</a:t>
+            </a:r>
+          </a:p>
+          <a:p>
+            <a:pPr lvl="1">
+              <a:lnSpc>
+                <a:spcPct val="114999"/>
+              </a:lnSpc>
+            </a:pPr>
+            <a:r>
+              <a:rPr lang="en" sz="1200" dirty="0">
+                <a:latin typeface="Calibri"/>
+                <a:ea typeface="+mn-lt"/>
+                <a:cs typeface="+mn-lt"/>
+              </a:rPr>
+              <a:t>Run the NLTK modules file: </a:t>
+            </a:r>
+            <a:r>
+              <a:rPr lang="en" sz="1050" dirty="0">
+                <a:solidFill>
+                  <a:schemeClr val="accent5">
+                    <a:lumMod val="75000"/>
+                  </a:schemeClr>
+                </a:solidFill>
+                <a:latin typeface="Courier" pitchFamily="2" charset="0"/>
+                <a:ea typeface="+mn-lt"/>
+                <a:cs typeface="Consolas" panose="020B0609020204030204" pitchFamily="49" charset="0"/>
+              </a:rPr>
+              <a:t>python </a:t>
+            </a:r>
+            <a:r>
+              <a:rPr lang="en" sz="1050" dirty="0" err="1">
+                <a:solidFill>
+                  <a:schemeClr val="accent5">
+                    <a:lumMod val="75000"/>
+                  </a:schemeClr>
+                </a:solidFill>
+                <a:latin typeface="Courier" pitchFamily="2" charset="0"/>
+                <a:ea typeface="+mn-lt"/>
+                <a:cs typeface="Consolas" panose="020B0609020204030204" pitchFamily="49" charset="0"/>
+              </a:rPr>
+              <a:t>nltk_modules.py</a:t>
+            </a:r>
+            <a:endParaRPr lang="en-US" sz="1050" dirty="0">
+              <a:solidFill>
+                <a:schemeClr val="accent5">
+                  <a:lumMod val="75000"/>
+                </a:schemeClr>
+              </a:solidFill>
+              <a:latin typeface="Courier" pitchFamily="2" charset="0"/>
+              <a:ea typeface="+mn-lt"/>
+              <a:cs typeface="Consolas" panose="020B0609020204030204" pitchFamily="49" charset="0"/>
+            </a:endParaRPr>
+          </a:p>
+          <a:p>
+            <a:pPr lvl="1">
+              <a:lnSpc>
+                <a:spcPct val="114999"/>
+              </a:lnSpc>
+            </a:pPr>
+            <a:r>
+              <a:rPr lang="en" sz="1200" dirty="0">
+                <a:latin typeface="Calibri"/>
+                <a:ea typeface="+mn-lt"/>
+                <a:cs typeface="+mn-lt"/>
+              </a:rPr>
+              <a:t>Run the server using </a:t>
+            </a:r>
+            <a:r>
+              <a:rPr lang="en" sz="1050" dirty="0">
+                <a:solidFill>
+                  <a:schemeClr val="accent5">
+                    <a:lumMod val="75000"/>
+                  </a:schemeClr>
+                </a:solidFill>
+                <a:latin typeface="Courier" pitchFamily="2" charset="0"/>
+                <a:ea typeface="+mn-lt"/>
+                <a:cs typeface="Consolas" panose="020B0609020204030204" pitchFamily="49" charset="0"/>
+              </a:rPr>
+              <a:t>python </a:t>
+            </a:r>
+            <a:r>
+              <a:rPr lang="en" sz="1050" dirty="0" err="1">
+                <a:solidFill>
+                  <a:schemeClr val="accent5">
+                    <a:lumMod val="75000"/>
+                  </a:schemeClr>
+                </a:solidFill>
+                <a:latin typeface="Courier" pitchFamily="2" charset="0"/>
+                <a:ea typeface="+mn-lt"/>
+                <a:cs typeface="Consolas" panose="020B0609020204030204" pitchFamily="49" charset="0"/>
+              </a:rPr>
+              <a:t>server.py</a:t>
+            </a:r>
+            <a:endParaRPr lang="en" sz="1200" dirty="0">
               <a:latin typeface="Calibri"/>
               <a:ea typeface="+mn-lt"/>
               <a:cs typeface="+mn-lt"/>
@@ -15992,231 +17579,101 @@
               </a:lnSpc>
             </a:pPr>
             <a:r>
-              <a:rPr lang="en" sz="1400" dirty="0">
+              <a:rPr lang="en-US" sz="1200" dirty="0">
                 <a:latin typeface="Calibri"/>
                 <a:ea typeface="+mn-lt"/>
                 <a:cs typeface="+mn-lt"/>
               </a:rPr>
-              <a:t>Install the required dependencies using “</a:t>
-            </a:r>
-            <a:r>
-              <a:rPr lang="en" sz="1400" i="1" dirty="0">
+              <a:t>Run Frontend Server</a:t>
+            </a:r>
+          </a:p>
+          <a:p>
+            <a:pPr lvl="1">
+              <a:lnSpc>
+                <a:spcPct val="114999"/>
+              </a:lnSpc>
+            </a:pPr>
+            <a:r>
+              <a:rPr lang="en" sz="1200" dirty="0">
                 <a:latin typeface="Calibri"/>
                 <a:ea typeface="+mn-lt"/>
                 <a:cs typeface="+mn-lt"/>
               </a:rPr>
-              <a:t>pip install -r requirements.txt”</a:t>
-            </a:r>
-            <a:r>
-              <a:rPr lang="en" sz="1400" dirty="0">
+              <a:t>Go to the directory frontend </a:t>
+            </a:r>
+            <a:r>
+              <a:rPr lang="en" sz="1050" dirty="0">
+                <a:solidFill>
+                  <a:schemeClr val="accent5">
+                    <a:lumMod val="75000"/>
+                  </a:schemeClr>
+                </a:solidFill>
+                <a:latin typeface="Courier" pitchFamily="2" charset="0"/>
+                <a:ea typeface="+mn-lt"/>
+                <a:cs typeface="Consolas" panose="020B0609020204030204" pitchFamily="49" charset="0"/>
+              </a:rPr>
+              <a:t>cd frontend</a:t>
+            </a:r>
+          </a:p>
+          <a:p>
+            <a:pPr lvl="1">
+              <a:lnSpc>
+                <a:spcPct val="114999"/>
+              </a:lnSpc>
+            </a:pPr>
+            <a:r>
+              <a:rPr lang="en" sz="1200" dirty="0">
                 <a:latin typeface="Calibri"/>
                 <a:ea typeface="+mn-lt"/>
                 <a:cs typeface="+mn-lt"/>
               </a:rPr>
-              <a:t> command. File “requirements.txt” lists the dependencies along with the version.</a:t>
-            </a:r>
-            <a:endParaRPr lang="en-US" sz="1400" dirty="0">
+              <a:t>Install the dependencies: </a:t>
+            </a:r>
+            <a:r>
+              <a:rPr lang="en" sz="1050" dirty="0" err="1">
+                <a:solidFill>
+                  <a:schemeClr val="accent5">
+                    <a:lumMod val="75000"/>
+                  </a:schemeClr>
+                </a:solidFill>
+                <a:latin typeface="Courier" pitchFamily="2" charset="0"/>
+                <a:ea typeface="+mn-lt"/>
+                <a:cs typeface="Consolas" panose="020B0609020204030204" pitchFamily="49" charset="0"/>
+              </a:rPr>
+              <a:t>npm</a:t>
+            </a:r>
+            <a:r>
+              <a:rPr lang="en" sz="1050" dirty="0">
+                <a:solidFill>
+                  <a:schemeClr val="accent5">
+                    <a:lumMod val="75000"/>
+                  </a:schemeClr>
+                </a:solidFill>
+                <a:latin typeface="Courier" pitchFamily="2" charset="0"/>
+                <a:ea typeface="+mn-lt"/>
+                <a:cs typeface="Consolas" panose="020B0609020204030204" pitchFamily="49" charset="0"/>
+              </a:rPr>
+              <a:t> install</a:t>
+            </a:r>
+            <a:endParaRPr lang="en" sz="1200" dirty="0">
+              <a:solidFill>
+                <a:schemeClr val="accent5">
+                  <a:lumMod val="75000"/>
+                </a:schemeClr>
+              </a:solidFill>
               <a:latin typeface="Calibri"/>
               <a:ea typeface="+mn-lt"/>
               <a:cs typeface="+mn-lt"/>
             </a:endParaRPr>
           </a:p>
           <a:p>
-            <a:pPr>
+            <a:pPr lvl="1">
               <a:lnSpc>
                 <a:spcPct val="114999"/>
               </a:lnSpc>
             </a:pPr>
             <a:r>
-              <a:rPr lang="en" sz="1400" dirty="0">
-                <a:latin typeface="Calibri"/>
-                <a:ea typeface="+mn-lt"/>
-                <a:cs typeface="+mn-lt"/>
-              </a:rPr>
-              <a:t>Go to the directory backend “</a:t>
-            </a:r>
-            <a:r>
-              <a:rPr lang="en" sz="1400" i="1" dirty="0">
-                <a:latin typeface="Calibri"/>
-                <a:ea typeface="+mn-lt"/>
-                <a:cs typeface="+mn-lt"/>
-              </a:rPr>
-              <a:t>cd backend</a:t>
-            </a:r>
-            <a:r>
-              <a:rPr lang="en" sz="1400" dirty="0">
-                <a:latin typeface="Calibri"/>
-                <a:ea typeface="+mn-lt"/>
-                <a:cs typeface="+mn-lt"/>
-              </a:rPr>
-              <a:t>”</a:t>
-            </a:r>
-            <a:endParaRPr lang="en-US" sz="1400" dirty="0">
-              <a:latin typeface="Calibri"/>
-              <a:ea typeface="+mn-lt"/>
-              <a:cs typeface="+mn-lt"/>
-            </a:endParaRPr>
-          </a:p>
-          <a:p>
-            <a:pPr>
-              <a:lnSpc>
-                <a:spcPct val="114999"/>
-              </a:lnSpc>
-            </a:pPr>
-            <a:r>
-              <a:rPr lang="en" sz="1400" dirty="0">
-                <a:latin typeface="Calibri"/>
-                <a:ea typeface="+mn-lt"/>
-                <a:cs typeface="+mn-lt"/>
-              </a:rPr>
-              <a:t>Run the modules of Natural Language Toolkit: “</a:t>
-            </a:r>
-            <a:r>
-              <a:rPr lang="en" sz="1400" i="1" dirty="0">
-                <a:latin typeface="Calibri"/>
-                <a:ea typeface="+mn-lt"/>
-                <a:cs typeface="+mn-lt"/>
-              </a:rPr>
-              <a:t>python nltk_modules.py”</a:t>
-            </a:r>
-            <a:endParaRPr lang="en-US" sz="1400" dirty="0">
-              <a:latin typeface="Calibri"/>
-              <a:ea typeface="+mn-lt"/>
-              <a:cs typeface="+mn-lt"/>
-            </a:endParaRPr>
-          </a:p>
-          <a:p>
-            <a:pPr>
-              <a:lnSpc>
-                <a:spcPct val="114999"/>
-              </a:lnSpc>
-            </a:pPr>
-            <a:r>
-              <a:rPr lang="en" sz="1400" dirty="0">
-                <a:latin typeface="Calibri"/>
-                <a:ea typeface="+mn-lt"/>
-                <a:cs typeface="+mn-lt"/>
-              </a:rPr>
-              <a:t>Run the server using “</a:t>
-            </a:r>
-            <a:r>
-              <a:rPr lang="en" sz="1400" i="1" dirty="0">
-                <a:latin typeface="Calibri"/>
-                <a:ea typeface="+mn-lt"/>
-                <a:cs typeface="+mn-lt"/>
-              </a:rPr>
-              <a:t>python server.py”</a:t>
-            </a:r>
-            <a:endParaRPr lang="en" sz="1400" dirty="0">
-              <a:latin typeface="Calibri"/>
-              <a:ea typeface="+mn-lt"/>
-              <a:cs typeface="+mn-lt"/>
-            </a:endParaRPr>
-          </a:p>
-          <a:p>
-            <a:pPr>
-              <a:lnSpc>
-                <a:spcPct val="114999"/>
-              </a:lnSpc>
-            </a:pPr>
-            <a:r>
-              <a:rPr lang="en" sz="1400" dirty="0">
-                <a:latin typeface="Calibri"/>
-                <a:ea typeface="+mn-lt"/>
-                <a:cs typeface="+mn-lt"/>
-              </a:rPr>
-              <a:t>Go back one level from the current “backend” directory using “</a:t>
-            </a:r>
-            <a:r>
-              <a:rPr lang="en" sz="1400" i="1" dirty="0">
-                <a:latin typeface="Calibri"/>
-                <a:ea typeface="+mn-lt"/>
-                <a:cs typeface="+mn-lt"/>
-              </a:rPr>
-              <a:t>cd..</a:t>
-            </a:r>
-            <a:r>
-              <a:rPr lang="en" sz="1400" dirty="0">
-                <a:latin typeface="Calibri"/>
-                <a:ea typeface="+mn-lt"/>
-                <a:cs typeface="+mn-lt"/>
-              </a:rPr>
-              <a:t>” and then change the current directory to “frontend”: “</a:t>
-            </a:r>
-            <a:r>
-              <a:rPr lang="en" sz="1400" i="1" dirty="0">
-                <a:latin typeface="Calibri"/>
-                <a:ea typeface="+mn-lt"/>
-                <a:cs typeface="+mn-lt"/>
-              </a:rPr>
-              <a:t>cd frontend”</a:t>
-            </a:r>
-            <a:endParaRPr lang="en" sz="1400" dirty="0">
-              <a:latin typeface="Calibri"/>
-              <a:ea typeface="+mn-lt"/>
-              <a:cs typeface="+mn-lt"/>
-            </a:endParaRPr>
-          </a:p>
-          <a:p>
-            <a:pPr>
-              <a:lnSpc>
-                <a:spcPct val="114999"/>
-              </a:lnSpc>
-            </a:pPr>
-            <a:r>
-              <a:rPr lang="en" sz="1400" dirty="0">
-                <a:latin typeface="Calibri"/>
-                <a:ea typeface="+mn-lt"/>
-                <a:cs typeface="+mn-lt"/>
-              </a:rPr>
-              <a:t>Install </a:t>
-            </a:r>
-            <a:r>
-              <a:rPr lang="en" sz="1400" dirty="0" err="1">
-                <a:latin typeface="Calibri"/>
-                <a:ea typeface="+mn-lt"/>
-                <a:cs typeface="+mn-lt"/>
-              </a:rPr>
-              <a:t>npm</a:t>
-            </a:r>
-            <a:r>
-              <a:rPr lang="en" sz="1400" dirty="0">
-                <a:latin typeface="Calibri"/>
-                <a:ea typeface="+mn-lt"/>
-                <a:cs typeface="+mn-lt"/>
-              </a:rPr>
-              <a:t>: “</a:t>
-            </a:r>
-            <a:r>
-              <a:rPr lang="en" sz="1400" i="1" dirty="0" err="1">
-                <a:latin typeface="Calibri"/>
-                <a:ea typeface="+mn-lt"/>
-                <a:cs typeface="+mn-lt"/>
-              </a:rPr>
-              <a:t>npm</a:t>
-            </a:r>
-            <a:r>
-              <a:rPr lang="en" sz="1400" i="1" dirty="0">
-                <a:latin typeface="Calibri"/>
-                <a:ea typeface="+mn-lt"/>
-                <a:cs typeface="+mn-lt"/>
-              </a:rPr>
-              <a:t> install”</a:t>
-            </a:r>
-            <a:endParaRPr lang="en" sz="1400" dirty="0">
-              <a:latin typeface="Calibri"/>
-              <a:ea typeface="+mn-lt"/>
-              <a:cs typeface="+mn-lt"/>
-            </a:endParaRPr>
-          </a:p>
-          <a:p>
-            <a:pPr>
-              <a:lnSpc>
-                <a:spcPct val="114999"/>
-              </a:lnSpc>
-            </a:pPr>
-            <a:r>
-              <a:rPr lang="en" sz="1400" dirty="0">
+              <a:rPr lang="en" sz="1200" dirty="0">
                 <a:latin typeface="Calibri"/>
                 <a:ea typeface="+mn-lt"/>
                 <a:cs typeface="+mn-lt"/>
@@ -16224,77 +17681,92 @@
               <a:t>Run the app: </a:t>
             </a:r>
             <a:r>
-              <a:rPr lang="en" sz="1400" i="1" dirty="0">
+              <a:rPr lang="en" sz="1050" dirty="0" err="1">
+                <a:solidFill>
+                  <a:schemeClr val="accent5">
+                    <a:lumMod val="75000"/>
+                  </a:schemeClr>
+                </a:solidFill>
+                <a:latin typeface="Courier" pitchFamily="2" charset="0"/>
+                <a:ea typeface="+mn-lt"/>
+                <a:cs typeface="Consolas" panose="020B0609020204030204" pitchFamily="49" charset="0"/>
+              </a:rPr>
+              <a:t>npm</a:t>
+            </a:r>
+            <a:r>
+              <a:rPr lang="en" sz="1050" dirty="0">
+                <a:solidFill>
+                  <a:schemeClr val="accent5">
+                    <a:lumMod val="75000"/>
+                  </a:schemeClr>
+                </a:solidFill>
+                <a:latin typeface="Courier" pitchFamily="2" charset="0"/>
+                <a:ea typeface="+mn-lt"/>
+                <a:cs typeface="Consolas" panose="020B0609020204030204" pitchFamily="49" charset="0"/>
+              </a:rPr>
+              <a:t> start</a:t>
+            </a:r>
+            <a:endParaRPr lang="en" sz="1200" dirty="0">
+              <a:latin typeface="Calibri"/>
+              <a:ea typeface="+mn-lt"/>
+              <a:cs typeface="+mn-lt"/>
+            </a:endParaRPr>
+          </a:p>
+          <a:p>
+            <a:pPr lvl="1">
+              <a:lnSpc>
+                <a:spcPct val="114999"/>
+              </a:lnSpc>
+            </a:pPr>
+            <a:r>
+              <a:rPr lang="en" sz="1200" dirty="0">
                 <a:latin typeface="Calibri"/>
                 <a:ea typeface="+mn-lt"/>
                 <a:cs typeface="+mn-lt"/>
               </a:rPr>
-              <a:t>“</a:t>
-            </a:r>
-            <a:r>
-              <a:rPr lang="en" sz="1400" i="1" dirty="0" err="1">
+              <a:t>Open a browser and go to URL: </a:t>
+            </a:r>
+            <a:r>
+              <a:rPr lang="en" sz="1200" dirty="0">
+                <a:solidFill>
+                  <a:schemeClr val="accent5">
+                    <a:lumMod val="75000"/>
+                  </a:schemeClr>
+                </a:solidFill>
                 <a:latin typeface="Calibri"/>
                 <a:ea typeface="+mn-lt"/>
                 <a:cs typeface="+mn-lt"/>
+                <a:hlinkClick r:id="rId4">
+                  <a:extLst>
+                    <a:ext uri="{A12FA001-AC4F-418D-AE19-62706E023703}">
+                      <ahyp:hlinkClr xmlns:ahyp="http://schemas.microsoft.com/office/drawing/2018/hyperlinkcolor" val="tx"/>
+                    </a:ext>
+                  </a:extLst>
+                </a:hlinkClick>
               </a:rPr>
-              <a:t>npm</a:t>
-            </a:r>
-            <a:r>
-              <a:rPr lang="en" sz="1400" i="1" dirty="0">
-                <a:latin typeface="Calibri"/>
-                <a:ea typeface="+mn-lt"/>
-                <a:cs typeface="+mn-lt"/>
-              </a:rPr>
-              <a:t> start”</a:t>
-            </a:r>
-            <a:endParaRPr lang="en" sz="1400" dirty="0">
+              <a:t>http://localhost:3000</a:t>
+            </a:r>
+            <a:endParaRPr lang="en" sz="1200" dirty="0">
+              <a:solidFill>
+                <a:schemeClr val="accent5">
+                  <a:lumMod val="75000"/>
+                </a:schemeClr>
+              </a:solidFill>
               <a:latin typeface="Calibri"/>
               <a:ea typeface="+mn-lt"/>
               <a:cs typeface="+mn-lt"/>
             </a:endParaRPr>
           </a:p>
           <a:p>
-            <a:pPr>
+            <a:pPr lvl="1">
               <a:lnSpc>
                 <a:spcPct val="114999"/>
               </a:lnSpc>
             </a:pPr>
-            <a:r>
-              <a:rPr lang="en" sz="1400" dirty="0">
-                <a:latin typeface="Calibri"/>
-                <a:ea typeface="+mn-lt"/>
-                <a:cs typeface="+mn-lt"/>
-              </a:rPr>
-              <a:t>Fire up a browser and hit the </a:t>
-            </a:r>
-            <a:r>
-              <a:rPr lang="en" sz="1400" dirty="0" err="1">
-                <a:latin typeface="Calibri"/>
-                <a:ea typeface="+mn-lt"/>
-                <a:cs typeface="+mn-lt"/>
-              </a:rPr>
-              <a:t>url</a:t>
-            </a:r>
-            <a:r>
-              <a:rPr lang="en" sz="1400" dirty="0">
-                <a:latin typeface="Calibri"/>
-                <a:ea typeface="+mn-lt"/>
-                <a:cs typeface="+mn-lt"/>
-              </a:rPr>
-              <a:t> </a:t>
-            </a:r>
-            <a:r>
-              <a:rPr lang="en" sz="1400" dirty="0">
-                <a:latin typeface="Calibri"/>
-                <a:ea typeface="+mn-lt"/>
-                <a:cs typeface="+mn-lt"/>
-                <a:hlinkClick r:id="rId3"/>
-              </a:rPr>
-              <a:t>http://localhost:3000</a:t>
-            </a:r>
-            <a:endParaRPr lang="en-US" sz="1400" dirty="0">
+            <a:endParaRPr lang="en-US" sz="1200" dirty="0">
               <a:latin typeface="Calibri"/>
-              <a:cs typeface="Calibri"/>
+              <a:ea typeface="+mn-lt"/>
+              <a:cs typeface="+mn-lt"/>
             </a:endParaRPr>
           </a:p>
           <a:p>
@@ -16580,4 +18052,299 @@
     </a:ext>
   </a:extLst>
 </a:theme>
+</file>
+
+<file path=ppt/theme/theme2.xml><?xml version="1.0" encoding="utf-8"?>
+<a:theme xmlns:a="http://schemas.openxmlformats.org/drawingml/2006/main" name="Office Theme">
+  <a:themeElements>
+    <a:clrScheme name="Office">
+      <a:dk1>
+        <a:sysClr val="windowText" lastClr="000000"/>
+      </a:dk1>
+      <a:lt1>
+        <a:sysClr val="window" lastClr="FFFFFF"/>
+      </a:lt1>
+      <a:dk2>
+        <a:srgbClr val="44546A"/>
+      </a:dk2>
+      <a:lt2>
+        <a:srgbClr val="E7E6E6"/>
+      </a:lt2>
+      <a:accent1>
+        <a:srgbClr val="4472C4"/>
+      </a:accent1>
+      <a:accent2>
+        <a:srgbClr val="ED7D31"/>
+      </a:accent2>
+      <a:accent3>
+        <a:srgbClr val="A5A5A5"/>
+      </a:accent3>
+      <a:accent4>
+        <a:srgbClr val="FFC000"/>
+      </a:accent4>
+      <a:accent5>
+        <a:srgbClr val="5B9BD5"/>
+      </a:accent5>
+      <a:accent6>
+        <a:srgbClr val="70AD47"/>
+      </a:accent6>
+      <a:hlink>
+        <a:srgbClr val="0563C1"/>
+      </a:hlink>
+      <a:folHlink>
+        <a:srgbClr val="954F72"/>
+      </a:folHlink>
+    </a:clrScheme>
+    <a:fontScheme name="Office">
+      <a:majorFont>
+        <a:latin typeface="Calibri Light" panose="020F0302020204030204"/>
+        <a:ea typeface=""/>
+        <a:cs typeface=""/>
+        <a:font script="Jpan" typeface="游ゴシック Light"/>
+        <a:font script="Hang" typeface="맑은 고딕"/>
+        <a:font script="Hans" typeface="等线 Light"/>
+        <a:font script="Hant" typeface="新細明體"/>
+        <a:font script="Arab" typeface="Times New Roman"/>
+        <a:font script="Hebr" typeface="Times New Roman"/>
+        <a:font script="Thai" typeface="Angsana New"/>
+        <a:font script="Ethi" typeface="Nyala"/>
+        <a:font script="Beng" typeface="Vrinda"/>
+        <a:font script="Gujr" typeface="Shruti"/>
+        <a:font script="Khmr" typeface="MoolBoran"/>
+        <a:font script="Knda" typeface="Tunga"/>
+        <a:font script="Guru" typeface="Raavi"/>
+        <a:font script="Cans" typeface="Euphemia"/>
+        <a:font script="Cher" typeface="Plantagenet Cherokee"/>
+        <a:font script="Yiii" typeface="Microsoft Yi Baiti"/>
+        <a:font script="Tibt" typeface="Microsoft Himalaya"/>
+        <a:font script="Thaa" typeface="MV Boli"/>
+        <a:font script="Deva" typeface="Mangal"/>
+        <a:font script="Telu" typeface="Gautami"/>
+        <a:font script="Taml" typeface="Latha"/>
+        <a:font script="Syrc" typeface="Estrangelo Edessa"/>
+        <a:font script="Orya" typeface="Kalinga"/>
+        <a:font script="Mlym" typeface="Kartika"/>
+        <a:font script="Laoo" typeface="DokChampa"/>
+        <a:font script="Sinh" typeface="Iskoola Pota"/>
+        <a:font script="Mong" typeface="Mongolian Baiti"/>
+        <a:font script="Viet" typeface="Times New Roman"/>
+        <a:font script="Uigh" typeface="Microsoft Uighur"/>
+        <a:font script="Geor" typeface="Sylfaen"/>
+        <a:font script="Armn" typeface="Arial"/>
+        <a:font script="Bugi" typeface="Leelawadee UI"/>
+        <a:font script="Bopo" typeface="Microsoft JhengHei"/>
+        <a:font script="Java" typeface="Javanese Text"/>
+        <a:font script="Lisu" typeface="Segoe UI"/>
+        <a:font script="Mymr" typeface="Myanmar Text"/>
+        <a:font script="Nkoo" typeface="Ebrima"/>
+        <a:font script="Olck" typeface="Nirmala UI"/>
+        <a:font script="Osma" typeface="Ebrima"/>
+        <a:font script="Phag" typeface="Phagspa"/>
+        <a:font script="Syrn" typeface="Estrangelo Edessa"/>
+        <a:font script="Syrj" typeface="Estrangelo Edessa"/>
+        <a:font script="Syre" typeface="Estrangelo Edessa"/>
+        <a:font script="Sora" typeface="Nirmala UI"/>
+        <a:font script="Tale" typeface="Microsoft Tai Le"/>
+        <a:font script="Talu" typeface="Microsoft New Tai Lue"/>
+        <a:font script="Tfng" typeface="Ebrima"/>
+      </a:majorFont>
+      <a:minorFont>
+        <a:latin typeface="Calibri" panose="020F0502020204030204"/>
+        <a:ea typeface=""/>
+        <a:cs typeface=""/>
+        <a:font script="Jpan" typeface="游ゴシック"/>
+        <a:font script="Hang" typeface="맑은 고딕"/>
+        <a:font script="Hans" typeface="等线"/>
+        <a:font script="Hant" typeface="新細明體"/>
+        <a:font script="Arab" typeface="Arial"/>
+        <a:font script="Hebr" typeface="Arial"/>
+        <a:font script="Thai" typeface="Cordia New"/>
+        <a:font script="Ethi" typeface="Nyala"/>
+        <a:font script="Beng" typeface="Vrinda"/>
+        <a:font script="Gujr" typeface="Shruti"/>
+        <a:font script="Khmr" typeface="DaunPenh"/>
+        <a:font script="Knda" typeface="Tunga"/>
+        <a:font script="Guru" typeface="Raavi"/>
+        <a:font script="Cans" typeface="Euphemia"/>
+        <a:font script="Cher" typeface="Plantagenet Cherokee"/>
+        <a:font script="Yiii" typeface="Microsoft Yi Baiti"/>
+        <a:font script="Tibt" typeface="Microsoft Himalaya"/>
+        <a:font script="Thaa" typeface="MV Boli"/>
+        <a:font script="Deva" typeface="Mangal"/>
+        <a:font script="Telu" typeface="Gautami"/>
+        <a:font script="Taml" typeface="Latha"/>
+        <a:font script="Syrc" typeface="Estrangelo Edessa"/>
+        <a:font script="Orya" typeface="Kalinga"/>
+        <a:font script="Mlym" typeface="Kartika"/>
+        <a:font script="Laoo" typeface="DokChampa"/>
+        <a:font script="Sinh" typeface="Iskoola Pota"/>
+        <a:font script="Mong" typeface="Mongolian Baiti"/>
+        <a:font script="Viet" typeface="Arial"/>
+        <a:font script="Uigh" typeface="Microsoft Uighur"/>
+        <a:font script="Geor" typeface="Sylfaen"/>
+        <a:font script="Armn" typeface="Arial"/>
+        <a:font script="Bugi" typeface="Leelawadee UI"/>
+        <a:font script="Bopo" typeface="Microsoft JhengHei"/>
+        <a:font script="Java" typeface="Javanese Text"/>
+        <a:font script="Lisu" typeface="Segoe UI"/>
+        <a:font script="Mymr" typeface="Myanmar Text"/>
+        <a:font script="Nkoo" typeface="Ebrima"/>
+        <a:font script="Olck" typeface="Nirmala UI"/>
+        <a:font script="Osma" typeface="Ebrima"/>
+        <a:font script="Phag" typeface="Phagspa"/>
+        <a:font script="Syrn" typeface="Estrangelo Edessa"/>
+        <a:font script="Syrj" typeface="Estrangelo Edessa"/>
+        <a:font script="Syre" typeface="Estrangelo Edessa"/>
+        <a:font script="Sora" typeface="Nirmala UI"/>
+        <a:font script="Tale" typeface="Microsoft Tai Le"/>
+        <a:font script="Talu" typeface="Microsoft New Tai Lue"/>
+        <a:font script="Tfng" typeface="Ebrima"/>
+      </a:minorFont>
+    </a:fontScheme>
+    <a:fmtScheme name="Office">
+      <a:fillStyleLst>
+        <a:solidFill>
+          <a:schemeClr val="phClr"/>
+        </a:solidFill>
+        <a:gradFill rotWithShape="1">
+          <a:gsLst>
+            <a:gs pos="0">
+              <a:schemeClr val="phClr">
+                <a:lumMod val="110000"/>
+                <a:satMod val="105000"/>
+                <a:tint val="67000"/>
+              </a:schemeClr>
+            </a:gs>
+            <a:gs pos="50000">
+              <a:schemeClr val="phClr">
+                <a:lumMod val="105000"/>
+                <a:satMod val="103000"/>
+                <a:tint val="73000"/>
+              </a:schemeClr>
+            </a:gs>
+            <a:gs pos="100000">
+              <a:schemeClr val="phClr">
+                <a:lumMod val="105000"/>
+                <a:satMod val="109000"/>
+                <a:tint val="81000"/>
+              </a:schemeClr>
+            </a:gs>
+          </a:gsLst>
+          <a:lin ang="5400000" scaled="0"/>
+        </a:gradFill>
+        <a:gradFill rotWithShape="1">
+          <a:gsLst>
+            <a:gs pos="0">
+              <a:schemeClr val="phClr">
+                <a:satMod val="103000"/>
+                <a:lumMod val="102000"/>
+                <a:tint val="94000"/>
+              </a:schemeClr>
+            </a:gs>
+            <a:gs pos="50000">
+              <a:schemeClr val="phClr">
+                <a:satMod val="110000"/>
+                <a:lumMod val="100000"/>
+                <a:shade val="100000"/>
+              </a:schemeClr>
+            </a:gs>
+            <a:gs pos="100000">
+              <a:schemeClr val="phClr">
+                <a:lumMod val="99000"/>
+                <a:satMod val="120000"/>
+                <a:shade val="78000"/>
+              </a:schemeClr>
+            </a:gs>
+          </a:gsLst>
+          <a:lin ang="5400000" scaled="0"/>
+        </a:gradFill>
+      </a:fillStyleLst>
+      <a:lnStyleLst>
+        <a:ln w="6350" cap="flat" cmpd="sng" algn="ctr">
+          <a:solidFill>
+            <a:schemeClr val="phClr"/>
+          </a:solidFill>
+          <a:prstDash val="solid"/>
+          <a:miter lim="800000"/>
+        </a:ln>
+        <a:ln w="12700" cap="flat" cmpd="sng" algn="ctr">
+          <a:solidFill>
+            <a:schemeClr val="phClr"/>
+          </a:solidFill>
+          <a:prstDash val="solid"/>
+          <a:miter lim="800000"/>
+        </a:ln>
+        <a:ln w="19050" cap="flat" cmpd="sng" algn="ctr">
+          <a:solidFill>
+            <a:schemeClr val="phClr"/>
+          </a:solidFill>
+          <a:prstDash val="solid"/>
+          <a:miter lim="800000"/>
+        </a:ln>
+      </a:lnStyleLst>
+      <a:effectStyleLst>
+        <a:effectStyle>
+          <a:effectLst/>
+        </a:effectStyle>
+        <a:effectStyle>
+          <a:effectLst/>
+        </a:effectStyle>
+        <a:effectStyle>
+          <a:effectLst>
+            <a:outerShdw blurRad="57150" dist="19050" dir="5400000" algn="ctr" rotWithShape="0">
+              <a:srgbClr val="000000">
+                <a:alpha val="63000"/>
+              </a:srgbClr>
+            </a:outerShdw>
+          </a:effectLst>
+        </a:effectStyle>
+      </a:effectStyleLst>
+      <a:bgFillStyleLst>
+        <a:solidFill>
+          <a:schemeClr val="phClr"/>
+        </a:solidFill>
+        <a:solidFill>
+          <a:schemeClr val="phClr">
+            <a:tint val="95000"/>
+            <a:satMod val="170000"/>
+          </a:schemeClr>
+        </a:solidFill>
+        <a:gradFill rotWithShape="1">
+          <a:gsLst>
+            <a:gs pos="0">
+              <a:schemeClr val="phClr">
+                <a:tint val="93000"/>
+                <a:satMod val="150000"/>
+                <a:shade val="98000"/>
+                <a:lumMod val="102000"/>
+              </a:schemeClr>
+            </a:gs>
+            <a:gs pos="50000">
+              <a:schemeClr val="phClr">
+                <a:tint val="98000"/>
+                <a:satMod val="130000"/>
+                <a:shade val="90000"/>
+                <a:lumMod val="103000"/>
+              </a:schemeClr>
+            </a:gs>
+            <a:gs pos="100000">
+              <a:schemeClr val="phClr">
+                <a:shade val="63000"/>
+                <a:satMod val="120000"/>
+              </a:schemeClr>
+            </a:gs>
+          </a:gsLst>
+          <a:lin ang="5400000" scaled="0"/>
+        </a:gradFill>
+      </a:bgFillStyleLst>
+    </a:fmtScheme>
+  </a:themeElements>
+  <a:objectDefaults/>
+  <a:extraClrSchemeLst/>
+  <a:extLst>
+    <a:ext uri="{05A4C25C-085E-4340-85A3-A5531E510DB2}">
+      <thm15:themeFamily xmlns:thm15="http://schemas.microsoft.com/office/thememl/2012/main" name="Office Theme" id="{62F939B6-93AF-4DB8-9C6B-D6C7DFDC589F}" vid="{4A3C46E8-61CC-4603-A589-7422A47A8E4A}"/>
+    </a:ext>
+  </a:extLst>
+</a:theme>
 </file>
</xml_diff>